<commit_message>
updated PPT with branches and rebasing
</commit_message>
<xml_diff>
--- a/GIT.pptx
+++ b/GIT.pptx
@@ -5,7 +5,7 @@
     <p:sldMasterId id="2147483784" r:id="rId1"/>
   </p:sldMasterIdLst>
   <p:notesMasterIdLst>
-    <p:notesMasterId r:id="rId13"/>
+    <p:notesMasterId r:id="rId28"/>
   </p:notesMasterIdLst>
   <p:sldIdLst>
     <p:sldId id="256" r:id="rId2"/>
@@ -18,7 +18,22 @@
     <p:sldId id="262" r:id="rId9"/>
     <p:sldId id="263" r:id="rId10"/>
     <p:sldId id="266" r:id="rId11"/>
-    <p:sldId id="264" r:id="rId12"/>
+    <p:sldId id="267" r:id="rId12"/>
+    <p:sldId id="268" r:id="rId13"/>
+    <p:sldId id="269" r:id="rId14"/>
+    <p:sldId id="270" r:id="rId15"/>
+    <p:sldId id="271" r:id="rId16"/>
+    <p:sldId id="272" r:id="rId17"/>
+    <p:sldId id="273" r:id="rId18"/>
+    <p:sldId id="274" r:id="rId19"/>
+    <p:sldId id="275" r:id="rId20"/>
+    <p:sldId id="276" r:id="rId21"/>
+    <p:sldId id="277" r:id="rId22"/>
+    <p:sldId id="278" r:id="rId23"/>
+    <p:sldId id="279" r:id="rId24"/>
+    <p:sldId id="280" r:id="rId25"/>
+    <p:sldId id="281" r:id="rId26"/>
+    <p:sldId id="264" r:id="rId27"/>
   </p:sldIdLst>
   <p:sldSz cx="9144000" cy="6858000" type="screen4x3"/>
   <p:notesSz cx="6858000" cy="9144000"/>
@@ -202,7 +217,7 @@
           <a:p>
             <a:fld id="{6BA818C6-122A-C54A-9BA7-B181109A049D}" type="datetimeFigureOut">
               <a:rPr lang="en-US" smtClean="0"/>
-              <a:t>9/22/13</a:t>
+              <a:t>9/30/13</a:t>
             </a:fld>
             <a:endParaRPr lang="en-US"/>
           </a:p>
@@ -1040,7 +1055,7 @@
           <a:p>
             <a:fld id="{F3F7ACB4-D3E4-F246-8585-4F078D14E97C}" type="datetimeFigureOut">
               <a:rPr lang="en-US" smtClean="0"/>
-              <a:t>9/22/13</a:t>
+              <a:t>9/30/13</a:t>
             </a:fld>
             <a:endParaRPr lang="en-US"/>
           </a:p>
@@ -1394,7 +1409,7 @@
           <a:p>
             <a:fld id="{F3F7ACB4-D3E4-F246-8585-4F078D14E97C}" type="datetimeFigureOut">
               <a:rPr lang="en-US" smtClean="0"/>
-              <a:t>9/22/13</a:t>
+              <a:t>9/30/13</a:t>
             </a:fld>
             <a:endParaRPr lang="en-US"/>
           </a:p>
@@ -1569,7 +1584,7 @@
           <a:p>
             <a:fld id="{F3F7ACB4-D3E4-F246-8585-4F078D14E97C}" type="datetimeFigureOut">
               <a:rPr lang="en-US" smtClean="0"/>
-              <a:t>9/22/13</a:t>
+              <a:t>9/30/13</a:t>
             </a:fld>
             <a:endParaRPr lang="en-US"/>
           </a:p>
@@ -1682,7 +1697,7 @@
           <a:p>
             <a:fld id="{F3F7ACB4-D3E4-F246-8585-4F078D14E97C}" type="datetimeFigureOut">
               <a:rPr lang="en-US" smtClean="0"/>
-              <a:t>9/22/13</a:t>
+              <a:t>9/30/13</a:t>
             </a:fld>
             <a:endParaRPr lang="en-US"/>
           </a:p>
@@ -2040,7 +2055,7 @@
           <a:p>
             <a:fld id="{F3F7ACB4-D3E4-F246-8585-4F078D14E97C}" type="datetimeFigureOut">
               <a:rPr lang="en-US" smtClean="0"/>
-              <a:t>9/22/13</a:t>
+              <a:t>9/30/13</a:t>
             </a:fld>
             <a:endParaRPr lang="en-US"/>
           </a:p>
@@ -2305,7 +2320,7 @@
           <a:p>
             <a:fld id="{F3F7ACB4-D3E4-F246-8585-4F078D14E97C}" type="datetimeFigureOut">
               <a:rPr lang="en-US" smtClean="0"/>
-              <a:t>9/22/13</a:t>
+              <a:t>9/30/13</a:t>
             </a:fld>
             <a:endParaRPr lang="en-US"/>
           </a:p>
@@ -2667,7 +2682,7 @@
           <a:p>
             <a:fld id="{F3F7ACB4-D3E4-F246-8585-4F078D14E97C}" type="datetimeFigureOut">
               <a:rPr lang="en-US" smtClean="0"/>
-              <a:t>9/22/13</a:t>
+              <a:t>9/30/13</a:t>
             </a:fld>
             <a:endParaRPr lang="en-US"/>
           </a:p>
@@ -2894,7 +2909,7 @@
           <a:p>
             <a:fld id="{F3F7ACB4-D3E4-F246-8585-4F078D14E97C}" type="datetimeFigureOut">
               <a:rPr lang="en-US" smtClean="0"/>
-              <a:t>9/22/13</a:t>
+              <a:t>9/30/13</a:t>
             </a:fld>
             <a:endParaRPr lang="en-US"/>
           </a:p>
@@ -2984,7 +2999,7 @@
           <a:p>
             <a:fld id="{F3F7ACB4-D3E4-F246-8585-4F078D14E97C}" type="datetimeFigureOut">
               <a:rPr lang="en-US" smtClean="0"/>
-              <a:t>9/22/13</a:t>
+              <a:t>9/30/13</a:t>
             </a:fld>
             <a:endParaRPr lang="en-US"/>
           </a:p>
@@ -3251,7 +3266,7 @@
           <a:p>
             <a:fld id="{F3F7ACB4-D3E4-F246-8585-4F078D14E97C}" type="datetimeFigureOut">
               <a:rPr lang="en-US" smtClean="0"/>
-              <a:t>9/22/13</a:t>
+              <a:t>9/30/13</a:t>
             </a:fld>
             <a:endParaRPr lang="en-US"/>
           </a:p>
@@ -3480,7 +3495,7 @@
           <a:p>
             <a:fld id="{F3F7ACB4-D3E4-F246-8585-4F078D14E97C}" type="datetimeFigureOut">
               <a:rPr lang="en-US" smtClean="0"/>
-              <a:t>9/22/13</a:t>
+              <a:t>9/30/13</a:t>
             </a:fld>
             <a:endParaRPr lang="en-US"/>
           </a:p>
@@ -3979,7 +3994,7 @@
           <a:p>
             <a:fld id="{F3F7ACB4-D3E4-F246-8585-4F078D14E97C}" type="datetimeFigureOut">
               <a:rPr lang="en-US" smtClean="0"/>
-              <a:t>9/22/13</a:t>
+              <a:t>9/30/13</a:t>
             </a:fld>
             <a:endParaRPr lang="en-US"/>
           </a:p>
@@ -4395,26 +4410,75 @@
         </p:nvSpPr>
         <p:spPr>
           <a:xfrm>
-            <a:off x="2286000" y="4800600"/>
-            <a:ext cx="6400800" cy="1600200"/>
+            <a:off x="337791" y="3553123"/>
+            <a:ext cx="8349009" cy="2847677"/>
           </a:xfrm>
         </p:spPr>
         <p:txBody>
           <a:bodyPr>
-            <a:normAutofit/>
+            <a:normAutofit fontScale="92500" lnSpcReduction="20000"/>
           </a:bodyPr>
           <a:lstStyle/>
           <a:p>
+            <a:r>
+              <a:rPr lang="en-US" dirty="0" smtClean="0"/>
+              <a:t>This Presentation is an informational presentation and none of the content or diagrams in it </a:t>
+            </a:r>
+            <a:r>
+              <a:rPr lang="en-US" dirty="0" smtClean="0"/>
+              <a:t>are</a:t>
+            </a:r>
+            <a:r>
+              <a:rPr lang="en-US" dirty="0" smtClean="0"/>
+              <a:t> original. I have used the </a:t>
+            </a:r>
+            <a:r>
+              <a:rPr lang="en-US" dirty="0" smtClean="0">
+                <a:hlinkClick r:id="rId2"/>
+              </a:rPr>
+              <a:t>ww</a:t>
+            </a:r>
+            <a:r>
+              <a:rPr lang="en-US" dirty="0" smtClean="0">
+                <a:hlinkClick r:id="rId2"/>
+              </a:rPr>
+              <a:t>w.git-scm.com</a:t>
+            </a:r>
+            <a:r>
+              <a:rPr lang="en-US" dirty="0" smtClean="0"/>
+              <a:t> for the content/diagrams of this presentation. This Presentation is created to teach the ladies at Women Who Code about GIT.</a:t>
+            </a:r>
             <a:endParaRPr lang="en-US" dirty="0" smtClean="0"/>
           </a:p>
           <a:p>
             <a:r>
               <a:rPr lang="en-US" dirty="0" smtClean="0"/>
-              <a:t>                                      --Sowjanya </a:t>
-            </a:r>
-            <a:r>
-              <a:rPr lang="en-US" dirty="0" err="1" smtClean="0"/>
-              <a:t>Mudunuri</a:t>
+              <a:t>                                     </a:t>
+            </a:r>
+            <a:endParaRPr lang="en-US" dirty="0" smtClean="0"/>
+          </a:p>
+          <a:p>
+            <a:endParaRPr lang="en-US" dirty="0"/>
+          </a:p>
+          <a:p>
+            <a:endParaRPr lang="en-US" dirty="0" smtClean="0"/>
+          </a:p>
+          <a:p>
+            <a:r>
+              <a:rPr lang="en-US" dirty="0"/>
+              <a:t>	</a:t>
+            </a:r>
+            <a:r>
+              <a:rPr lang="en-US" dirty="0" smtClean="0"/>
+              <a:t>								</a:t>
+            </a:r>
+            <a:r>
+              <a:rPr lang="en-US" dirty="0" smtClean="0"/>
+              <a:t> </a:t>
+            </a:r>
+            <a:r>
+              <a:rPr lang="en-US" dirty="0" smtClean="0"/>
+              <a:t>--Sowjanya Mudunuri</a:t>
             </a:r>
             <a:endParaRPr lang="en-US" dirty="0"/>
           </a:p>
@@ -4573,49 +4637,95 @@
         </p:nvSpPr>
         <p:spPr/>
         <p:txBody>
+          <a:bodyPr>
+            <a:normAutofit fontScale="90000"/>
+          </a:bodyPr>
+          <a:lstStyle/>
+          <a:p>
+            <a:r>
+              <a:rPr lang="en-US" dirty="0" smtClean="0"/>
+              <a:t>Refresher….</a:t>
+            </a:r>
+            <a:r>
+              <a:rPr lang="en-US" dirty="0"/>
+              <a:t> What is a GIT Commit?</a:t>
+            </a:r>
+            <a:br>
+              <a:rPr lang="en-US" dirty="0"/>
+            </a:br>
+            <a:endParaRPr lang="en-US" dirty="0"/>
+          </a:p>
+        </p:txBody>
+      </p:sp>
+      <p:sp>
+        <p:nvSpPr>
+          <p:cNvPr id="3" name="Content Placeholder 2"/>
+          <p:cNvSpPr>
+            <a:spLocks noGrp="1"/>
+          </p:cNvSpPr>
+          <p:nvPr>
+            <p:ph sz="quarter" idx="1"/>
+          </p:nvPr>
+        </p:nvSpPr>
+        <p:spPr/>
+        <p:txBody>
           <a:bodyPr/>
           <a:lstStyle/>
           <a:p>
-            <a:r>
-              <a:rPr lang="en-US" dirty="0" smtClean="0"/>
-              <a:t>References</a:t>
+            <a:pPr>
+              <a:buFont typeface="Arial"/>
+              <a:buChar char="•"/>
+            </a:pPr>
+            <a:r>
+              <a:rPr lang="en-US" dirty="0" smtClean="0"/>
+              <a:t>It is a commit object that contains a pointer to the snapshot of the content you staged, the author and message meta data,</a:t>
+            </a:r>
+            <a:r>
+              <a:rPr lang="en-US" dirty="0"/>
+              <a:t> </a:t>
+            </a:r>
+            <a:r>
+              <a:rPr lang="en-US" dirty="0" smtClean="0"/>
+              <a:t>and pointers to the commit/commits that were direct parents of this commit.  </a:t>
+            </a:r>
+          </a:p>
+          <a:p>
+            <a:pPr>
+              <a:buFont typeface="Arial"/>
+              <a:buChar char="•"/>
+            </a:pPr>
+            <a:r>
+              <a:rPr lang="en-US" dirty="0" smtClean="0"/>
+              <a:t>Zero parents for the first commit, one parent for a normal commit, and multiple parents for a commit that results from a merge of two or more branches. </a:t>
+            </a:r>
+          </a:p>
+          <a:p>
+            <a:pPr>
+              <a:buFont typeface="Arial"/>
+              <a:buChar char="•"/>
+            </a:pPr>
+            <a:r>
+              <a:rPr lang="en-US" dirty="0" smtClean="0"/>
+              <a:t>$ </a:t>
+            </a:r>
+            <a:r>
+              <a:rPr lang="en-US" dirty="0" err="1" smtClean="0"/>
+              <a:t>git</a:t>
+            </a:r>
+            <a:r>
+              <a:rPr lang="en-US" dirty="0" smtClean="0"/>
+              <a:t> commit –m “My message”</a:t>
             </a:r>
             <a:endParaRPr lang="en-US" dirty="0"/>
           </a:p>
         </p:txBody>
       </p:sp>
-      <p:sp>
-        <p:nvSpPr>
-          <p:cNvPr id="3" name="Content Placeholder 2"/>
-          <p:cNvSpPr>
-            <a:spLocks noGrp="1"/>
-          </p:cNvSpPr>
-          <p:nvPr>
-            <p:ph sz="quarter" idx="1"/>
-          </p:nvPr>
-        </p:nvSpPr>
-        <p:spPr/>
-        <p:txBody>
-          <a:bodyPr/>
-          <a:lstStyle/>
-          <a:p>
-            <a:r>
-              <a:rPr lang="en-US" dirty="0" smtClean="0"/>
-              <a:t>http://git-</a:t>
-            </a:r>
-            <a:r>
-              <a:rPr lang="en-US" dirty="0" err="1" smtClean="0"/>
-              <a:t>scm.com</a:t>
-            </a:r>
-            <a:r>
-              <a:rPr lang="en-US" dirty="0" smtClean="0"/>
-              <a:t>/</a:t>
-            </a:r>
-            <a:endParaRPr lang="en-US" dirty="0"/>
-          </a:p>
-        </p:txBody>
-      </p:sp>
     </p:spTree>
+    <p:extLst>
+      <p:ext uri="{BB962C8B-B14F-4D97-AF65-F5344CB8AC3E}">
+        <p14:creationId xmlns:p14="http://schemas.microsoft.com/office/powerpoint/2010/main" val="3826702023"/>
+      </p:ext>
+    </p:extLst>
   </p:cSld>
   <p:clrMapOvr>
     <a:masterClrMapping/>
@@ -4627,6 +4737,1288 @@
       </p:par>
     </p:tnLst>
   </p:timing>
+</p:sld>
+</file>
+
+<file path=ppt/slides/slide12.xml><?xml version="1.0" encoding="utf-8"?>
+<p:sld xmlns:a="http://schemas.openxmlformats.org/drawingml/2006/main" xmlns:r="http://schemas.openxmlformats.org/officeDocument/2006/relationships" xmlns:p="http://schemas.openxmlformats.org/presentationml/2006/main">
+  <p:cSld>
+    <p:spTree>
+      <p:nvGrpSpPr>
+        <p:cNvPr id="1" name=""/>
+        <p:cNvGrpSpPr/>
+        <p:nvPr/>
+      </p:nvGrpSpPr>
+      <p:grpSpPr>
+        <a:xfrm>
+          <a:off x="0" y="0"/>
+          <a:ext cx="0" cy="0"/>
+          <a:chOff x="0" y="0"/>
+          <a:chExt cx="0" cy="0"/>
+        </a:xfrm>
+      </p:grpSpPr>
+      <p:sp>
+        <p:nvSpPr>
+          <p:cNvPr id="2" name="Title 1"/>
+          <p:cNvSpPr>
+            <a:spLocks noGrp="1"/>
+          </p:cNvSpPr>
+          <p:nvPr>
+            <p:ph type="title"/>
+          </p:nvPr>
+        </p:nvSpPr>
+        <p:spPr>
+          <a:xfrm>
+            <a:off x="914400" y="274638"/>
+            <a:ext cx="7772400" cy="738610"/>
+          </a:xfrm>
+        </p:spPr>
+        <p:txBody>
+          <a:bodyPr>
+            <a:normAutofit fontScale="90000"/>
+          </a:bodyPr>
+          <a:lstStyle/>
+          <a:p>
+            <a:r>
+              <a:rPr lang="en-US" dirty="0" smtClean="0"/>
+              <a:t>What is a GIT BRANCH ?</a:t>
+            </a:r>
+            <a:endParaRPr lang="en-US" dirty="0"/>
+          </a:p>
+        </p:txBody>
+      </p:sp>
+      <p:sp>
+        <p:nvSpPr>
+          <p:cNvPr id="3" name="Content Placeholder 2"/>
+          <p:cNvSpPr>
+            <a:spLocks noGrp="1"/>
+          </p:cNvSpPr>
+          <p:nvPr>
+            <p:ph sz="quarter" idx="1"/>
+          </p:nvPr>
+        </p:nvSpPr>
+        <p:spPr>
+          <a:xfrm>
+            <a:off x="914400" y="1107818"/>
+            <a:ext cx="7772400" cy="4911982"/>
+          </a:xfrm>
+        </p:spPr>
+        <p:txBody>
+          <a:bodyPr>
+            <a:normAutofit fontScale="92500" lnSpcReduction="20000"/>
+          </a:bodyPr>
+          <a:lstStyle/>
+          <a:p>
+            <a:r>
+              <a:rPr lang="en-US" dirty="0" smtClean="0"/>
+              <a:t>It</a:t>
+            </a:r>
+            <a:r>
+              <a:rPr lang="fr-FR" dirty="0" smtClean="0"/>
+              <a:t>’</a:t>
+            </a:r>
+            <a:r>
+              <a:rPr lang="en-US" dirty="0" smtClean="0"/>
+              <a:t>s a movable pointer to one of the commits</a:t>
+            </a:r>
+          </a:p>
+          <a:p>
+            <a:r>
+              <a:rPr lang="en-US" dirty="0" smtClean="0"/>
+              <a:t>The default branch in GIT is master</a:t>
+            </a:r>
+          </a:p>
+          <a:p>
+            <a:r>
+              <a:rPr lang="en-US" dirty="0" smtClean="0"/>
+              <a:t>As you initially make commits, you’re given a master branch that points to the last commit you made</a:t>
+            </a:r>
+          </a:p>
+          <a:p>
+            <a:r>
+              <a:rPr lang="en-US" dirty="0" err="1" smtClean="0"/>
+              <a:t>Everytime</a:t>
+            </a:r>
+            <a:r>
+              <a:rPr lang="en-US" dirty="0" smtClean="0"/>
+              <a:t> you commit the pointer moves forward </a:t>
+            </a:r>
+          </a:p>
+          <a:p>
+            <a:endParaRPr lang="en-US" dirty="0"/>
+          </a:p>
+          <a:p>
+            <a:endParaRPr lang="en-US" dirty="0" smtClean="0"/>
+          </a:p>
+          <a:p>
+            <a:endParaRPr lang="en-US" dirty="0" smtClean="0"/>
+          </a:p>
+          <a:p>
+            <a:endParaRPr lang="en-US" dirty="0"/>
+          </a:p>
+          <a:p>
+            <a:pPr lvl="8"/>
+            <a:r>
+              <a:rPr lang="en-US" dirty="0" smtClean="0"/>
+              <a:t>											</a:t>
+            </a:r>
+          </a:p>
+          <a:p>
+            <a:pPr marL="2240280" lvl="8" indent="0">
+              <a:buNone/>
+            </a:pPr>
+            <a:r>
+              <a:rPr lang="en-US" dirty="0"/>
+              <a:t>	</a:t>
+            </a:r>
+            <a:r>
+              <a:rPr lang="en-US" dirty="0" smtClean="0"/>
+              <a:t>			</a:t>
+            </a:r>
+          </a:p>
+          <a:p>
+            <a:pPr marL="2240280" lvl="8" indent="0">
+              <a:buNone/>
+            </a:pPr>
+            <a:endParaRPr lang="en-US" dirty="0"/>
+          </a:p>
+          <a:p>
+            <a:pPr marL="2240280" lvl="8" indent="0">
+              <a:buNone/>
+            </a:pPr>
+            <a:endParaRPr lang="en-US" dirty="0" smtClean="0"/>
+          </a:p>
+          <a:p>
+            <a:pPr marL="2240280" lvl="8" indent="0">
+              <a:buNone/>
+            </a:pPr>
+            <a:r>
+              <a:rPr lang="en-US" dirty="0"/>
+              <a:t>	</a:t>
+            </a:r>
+            <a:r>
+              <a:rPr lang="en-US" dirty="0" smtClean="0"/>
+              <a:t>			--Ref </a:t>
+            </a:r>
+            <a:r>
+              <a:rPr lang="en-US" dirty="0" err="1" smtClean="0"/>
+              <a:t>git-scm.com</a:t>
+            </a:r>
+            <a:endParaRPr lang="en-US" dirty="0"/>
+          </a:p>
+        </p:txBody>
+      </p:sp>
+      <p:pic>
+        <p:nvPicPr>
+          <p:cNvPr id="5" name="Picture 4" descr="http://git-scm.com/figures/18333fig0303-tn.png"/>
+          <p:cNvPicPr/>
+          <p:nvPr/>
+        </p:nvPicPr>
+        <p:blipFill>
+          <a:blip r:embed="rId2">
+            <a:extLst>
+              <a:ext uri="{28A0092B-C50C-407E-A947-70E740481C1C}">
+                <a14:useLocalDpi xmlns:a14="http://schemas.microsoft.com/office/drawing/2010/main" val="0"/>
+              </a:ext>
+            </a:extLst>
+          </a:blip>
+          <a:srcRect/>
+          <a:stretch>
+            <a:fillRect/>
+          </a:stretch>
+        </p:blipFill>
+        <p:spPr bwMode="auto">
+          <a:xfrm>
+            <a:off x="1397000" y="2958684"/>
+            <a:ext cx="6350000" cy="2350736"/>
+          </a:xfrm>
+          <a:prstGeom prst="rect">
+            <a:avLst/>
+          </a:prstGeom>
+          <a:noFill/>
+          <a:ln>
+            <a:noFill/>
+          </a:ln>
+        </p:spPr>
+      </p:pic>
+    </p:spTree>
+    <p:extLst>
+      <p:ext uri="{BB962C8B-B14F-4D97-AF65-F5344CB8AC3E}">
+        <p14:creationId xmlns:p14="http://schemas.microsoft.com/office/powerpoint/2010/main" val="3798774019"/>
+      </p:ext>
+    </p:extLst>
+  </p:cSld>
+  <p:clrMapOvr>
+    <a:masterClrMapping/>
+  </p:clrMapOvr>
+  <p:timing>
+    <p:tnLst>
+      <p:par>
+        <p:cTn xmlns:p14="http://schemas.microsoft.com/office/powerpoint/2010/main" id="1" dur="indefinite" restart="never" nodeType="tmRoot"/>
+      </p:par>
+    </p:tnLst>
+  </p:timing>
+</p:sld>
+</file>
+
+<file path=ppt/slides/slide13.xml><?xml version="1.0" encoding="utf-8"?>
+<p:sld xmlns:a="http://schemas.openxmlformats.org/drawingml/2006/main" xmlns:r="http://schemas.openxmlformats.org/officeDocument/2006/relationships" xmlns:p="http://schemas.openxmlformats.org/presentationml/2006/main">
+  <p:cSld>
+    <p:spTree>
+      <p:nvGrpSpPr>
+        <p:cNvPr id="1" name=""/>
+        <p:cNvGrpSpPr/>
+        <p:nvPr/>
+      </p:nvGrpSpPr>
+      <p:grpSpPr>
+        <a:xfrm>
+          <a:off x="0" y="0"/>
+          <a:ext cx="0" cy="0"/>
+          <a:chOff x="0" y="0"/>
+          <a:chExt cx="0" cy="0"/>
+        </a:xfrm>
+      </p:grpSpPr>
+      <p:sp>
+        <p:nvSpPr>
+          <p:cNvPr id="2" name="Title 1"/>
+          <p:cNvSpPr>
+            <a:spLocks noGrp="1"/>
+          </p:cNvSpPr>
+          <p:nvPr>
+            <p:ph type="title"/>
+          </p:nvPr>
+        </p:nvSpPr>
+        <p:spPr/>
+        <p:txBody>
+          <a:bodyPr/>
+          <a:lstStyle/>
+          <a:p>
+            <a:r>
+              <a:rPr lang="en-US" dirty="0" smtClean="0"/>
+              <a:t>Creating a New Branch</a:t>
+            </a:r>
+            <a:endParaRPr lang="en-US" dirty="0"/>
+          </a:p>
+        </p:txBody>
+      </p:sp>
+      <p:sp>
+        <p:nvSpPr>
+          <p:cNvPr id="3" name="Content Placeholder 2"/>
+          <p:cNvSpPr>
+            <a:spLocks noGrp="1"/>
+          </p:cNvSpPr>
+          <p:nvPr>
+            <p:ph sz="quarter" idx="1"/>
+          </p:nvPr>
+        </p:nvSpPr>
+        <p:spPr/>
+        <p:txBody>
+          <a:bodyPr>
+            <a:normAutofit fontScale="92500" lnSpcReduction="20000"/>
+          </a:bodyPr>
+          <a:lstStyle/>
+          <a:p>
+            <a:r>
+              <a:rPr lang="en-US" dirty="0" smtClean="0"/>
+              <a:t>$ </a:t>
+            </a:r>
+            <a:r>
+              <a:rPr lang="en-US" dirty="0" err="1" smtClean="0"/>
+              <a:t>git</a:t>
+            </a:r>
+            <a:r>
+              <a:rPr lang="en-US" dirty="0" smtClean="0"/>
+              <a:t> branch testing</a:t>
+            </a:r>
+          </a:p>
+          <a:p>
+            <a:r>
+              <a:rPr lang="en-US" dirty="0" smtClean="0"/>
+              <a:t>It creates a new pointer for you to move around. </a:t>
+            </a:r>
+          </a:p>
+          <a:p>
+            <a:r>
+              <a:rPr lang="en-US" dirty="0" smtClean="0"/>
+              <a:t>This new pointer is at the same commit you’re currently on.</a:t>
+            </a:r>
+          </a:p>
+          <a:p>
+            <a:endParaRPr lang="en-US" dirty="0"/>
+          </a:p>
+          <a:p>
+            <a:endParaRPr lang="en-US" dirty="0" smtClean="0"/>
+          </a:p>
+          <a:p>
+            <a:endParaRPr lang="en-US" dirty="0"/>
+          </a:p>
+          <a:p>
+            <a:endParaRPr lang="en-US" dirty="0" smtClean="0"/>
+          </a:p>
+          <a:p>
+            <a:endParaRPr lang="en-US" dirty="0"/>
+          </a:p>
+          <a:p>
+            <a:endParaRPr lang="en-US" dirty="0" smtClean="0"/>
+          </a:p>
+          <a:p>
+            <a:endParaRPr lang="en-US" dirty="0"/>
+          </a:p>
+          <a:p>
+            <a:pPr marL="2240280" lvl="8" indent="0">
+              <a:buNone/>
+            </a:pPr>
+            <a:endParaRPr lang="en-US" dirty="0" smtClean="0"/>
+          </a:p>
+          <a:p>
+            <a:pPr lvl="8"/>
+            <a:endParaRPr lang="en-US" dirty="0"/>
+          </a:p>
+          <a:p>
+            <a:pPr lvl="8"/>
+            <a:r>
+              <a:rPr lang="en-US" dirty="0" smtClean="0"/>
+              <a:t>                                                                       Ref: </a:t>
+            </a:r>
+            <a:r>
+              <a:rPr lang="en-US" dirty="0" err="1" smtClean="0"/>
+              <a:t>git-scm.com</a:t>
+            </a:r>
+            <a:endParaRPr lang="en-US" dirty="0" smtClean="0"/>
+          </a:p>
+          <a:p>
+            <a:pPr lvl="8"/>
+            <a:endParaRPr lang="en-US" dirty="0"/>
+          </a:p>
+          <a:p>
+            <a:pPr lvl="8"/>
+            <a:endParaRPr lang="en-US" dirty="0"/>
+          </a:p>
+        </p:txBody>
+      </p:sp>
+      <p:pic>
+        <p:nvPicPr>
+          <p:cNvPr id="4" name="Picture 3" descr="http://git-scm.com/figures/18333fig0304-tn.png"/>
+          <p:cNvPicPr/>
+          <p:nvPr/>
+        </p:nvPicPr>
+        <p:blipFill>
+          <a:blip r:embed="rId2">
+            <a:extLst>
+              <a:ext uri="{28A0092B-C50C-407E-A947-70E740481C1C}">
+                <a14:useLocalDpi xmlns:a14="http://schemas.microsoft.com/office/drawing/2010/main" val="0"/>
+              </a:ext>
+            </a:extLst>
+          </a:blip>
+          <a:srcRect/>
+          <a:stretch>
+            <a:fillRect/>
+          </a:stretch>
+        </p:blipFill>
+        <p:spPr bwMode="auto">
+          <a:xfrm>
+            <a:off x="1286854" y="3053218"/>
+            <a:ext cx="6887686" cy="2310241"/>
+          </a:xfrm>
+          <a:prstGeom prst="rect">
+            <a:avLst/>
+          </a:prstGeom>
+          <a:noFill/>
+          <a:ln>
+            <a:noFill/>
+          </a:ln>
+        </p:spPr>
+      </p:pic>
+    </p:spTree>
+    <p:extLst>
+      <p:ext uri="{BB962C8B-B14F-4D97-AF65-F5344CB8AC3E}">
+        <p14:creationId xmlns:p14="http://schemas.microsoft.com/office/powerpoint/2010/main" val="1676189552"/>
+      </p:ext>
+    </p:extLst>
+  </p:cSld>
+  <p:clrMapOvr>
+    <a:masterClrMapping/>
+  </p:clrMapOvr>
+  <p:timing>
+    <p:tnLst>
+      <p:par>
+        <p:cTn xmlns:p14="http://schemas.microsoft.com/office/powerpoint/2010/main" id="1" dur="indefinite" restart="never" nodeType="tmRoot"/>
+      </p:par>
+    </p:tnLst>
+  </p:timing>
+</p:sld>
+</file>
+
+<file path=ppt/slides/slide14.xml><?xml version="1.0" encoding="utf-8"?>
+<p:sld xmlns:a="http://schemas.openxmlformats.org/drawingml/2006/main" xmlns:r="http://schemas.openxmlformats.org/officeDocument/2006/relationships" xmlns:p="http://schemas.openxmlformats.org/presentationml/2006/main">
+  <p:cSld>
+    <p:spTree>
+      <p:nvGrpSpPr>
+        <p:cNvPr id="1" name=""/>
+        <p:cNvGrpSpPr/>
+        <p:nvPr/>
+      </p:nvGrpSpPr>
+      <p:grpSpPr>
+        <a:xfrm>
+          <a:off x="0" y="0"/>
+          <a:ext cx="0" cy="0"/>
+          <a:chOff x="0" y="0"/>
+          <a:chExt cx="0" cy="0"/>
+        </a:xfrm>
+      </p:grpSpPr>
+      <p:sp>
+        <p:nvSpPr>
+          <p:cNvPr id="2" name="Title 1"/>
+          <p:cNvSpPr>
+            <a:spLocks noGrp="1"/>
+          </p:cNvSpPr>
+          <p:nvPr>
+            <p:ph type="title"/>
+          </p:nvPr>
+        </p:nvSpPr>
+        <p:spPr/>
+        <p:txBody>
+          <a:bodyPr/>
+          <a:lstStyle/>
+          <a:p>
+            <a:r>
+              <a:rPr lang="en-US" dirty="0" smtClean="0"/>
+              <a:t>More on Branches…</a:t>
+            </a:r>
+            <a:endParaRPr lang="en-US" dirty="0"/>
+          </a:p>
+        </p:txBody>
+      </p:sp>
+      <p:sp>
+        <p:nvSpPr>
+          <p:cNvPr id="3" name="Content Placeholder 2"/>
+          <p:cNvSpPr>
+            <a:spLocks noGrp="1"/>
+          </p:cNvSpPr>
+          <p:nvPr>
+            <p:ph sz="quarter" idx="1"/>
+          </p:nvPr>
+        </p:nvSpPr>
+        <p:spPr/>
+        <p:txBody>
+          <a:bodyPr/>
+          <a:lstStyle/>
+          <a:p>
+            <a:r>
+              <a:rPr lang="en-US" dirty="0" smtClean="0"/>
+              <a:t>HEAD – Is a pointer to the local branch you are currently on</a:t>
+            </a:r>
+          </a:p>
+          <a:p>
+            <a:r>
+              <a:rPr lang="en-US" dirty="0" smtClean="0"/>
+              <a:t>$</a:t>
+            </a:r>
+            <a:r>
+              <a:rPr lang="en-US" dirty="0" err="1" smtClean="0"/>
+              <a:t>git</a:t>
+            </a:r>
+            <a:r>
+              <a:rPr lang="en-US" dirty="0" smtClean="0"/>
+              <a:t> branch testing </a:t>
+            </a:r>
+          </a:p>
+          <a:p>
+            <a:r>
+              <a:rPr lang="en-US" dirty="0" smtClean="0"/>
+              <a:t>The above command only created a new branch. It did not switch the branch</a:t>
+            </a:r>
+          </a:p>
+          <a:p>
+            <a:endParaRPr lang="en-US" dirty="0"/>
+          </a:p>
+        </p:txBody>
+      </p:sp>
+      <p:pic>
+        <p:nvPicPr>
+          <p:cNvPr id="4" name="Picture 3" descr="http://git-scm.com/figures/18333fig0305-tn.png"/>
+          <p:cNvPicPr/>
+          <p:nvPr/>
+        </p:nvPicPr>
+        <p:blipFill>
+          <a:blip r:embed="rId2">
+            <a:extLst>
+              <a:ext uri="{28A0092B-C50C-407E-A947-70E740481C1C}">
+                <a14:useLocalDpi xmlns:a14="http://schemas.microsoft.com/office/drawing/2010/main" val="0"/>
+              </a:ext>
+            </a:extLst>
+          </a:blip>
+          <a:srcRect/>
+          <a:stretch>
+            <a:fillRect/>
+          </a:stretch>
+        </p:blipFill>
+        <p:spPr bwMode="auto">
+          <a:xfrm>
+            <a:off x="1705714" y="3504724"/>
+            <a:ext cx="5651500" cy="2726169"/>
+          </a:xfrm>
+          <a:prstGeom prst="rect">
+            <a:avLst/>
+          </a:prstGeom>
+          <a:noFill/>
+          <a:ln>
+            <a:noFill/>
+          </a:ln>
+        </p:spPr>
+      </p:pic>
+    </p:spTree>
+    <p:extLst>
+      <p:ext uri="{BB962C8B-B14F-4D97-AF65-F5344CB8AC3E}">
+        <p14:creationId xmlns:p14="http://schemas.microsoft.com/office/powerpoint/2010/main" val="1446363585"/>
+      </p:ext>
+    </p:extLst>
+  </p:cSld>
+  <p:clrMapOvr>
+    <a:masterClrMapping/>
+  </p:clrMapOvr>
+</p:sld>
+</file>
+
+<file path=ppt/slides/slide15.xml><?xml version="1.0" encoding="utf-8"?>
+<p:sld xmlns:a="http://schemas.openxmlformats.org/drawingml/2006/main" xmlns:r="http://schemas.openxmlformats.org/officeDocument/2006/relationships" xmlns:p="http://schemas.openxmlformats.org/presentationml/2006/main">
+  <p:cSld>
+    <p:spTree>
+      <p:nvGrpSpPr>
+        <p:cNvPr id="1" name=""/>
+        <p:cNvGrpSpPr/>
+        <p:nvPr/>
+      </p:nvGrpSpPr>
+      <p:grpSpPr>
+        <a:xfrm>
+          <a:off x="0" y="0"/>
+          <a:ext cx="0" cy="0"/>
+          <a:chOff x="0" y="0"/>
+          <a:chExt cx="0" cy="0"/>
+        </a:xfrm>
+      </p:grpSpPr>
+      <p:sp>
+        <p:nvSpPr>
+          <p:cNvPr id="2" name="Title 1"/>
+          <p:cNvSpPr>
+            <a:spLocks noGrp="1"/>
+          </p:cNvSpPr>
+          <p:nvPr>
+            <p:ph type="title"/>
+          </p:nvPr>
+        </p:nvSpPr>
+        <p:spPr/>
+        <p:txBody>
+          <a:bodyPr/>
+          <a:lstStyle/>
+          <a:p>
+            <a:r>
+              <a:rPr lang="en-US" dirty="0" smtClean="0"/>
+              <a:t>More on Branches…</a:t>
+            </a:r>
+            <a:endParaRPr lang="en-US" dirty="0"/>
+          </a:p>
+        </p:txBody>
+      </p:sp>
+      <p:sp>
+        <p:nvSpPr>
+          <p:cNvPr id="3" name="Content Placeholder 2"/>
+          <p:cNvSpPr>
+            <a:spLocks noGrp="1"/>
+          </p:cNvSpPr>
+          <p:nvPr>
+            <p:ph sz="quarter" idx="1"/>
+          </p:nvPr>
+        </p:nvSpPr>
+        <p:spPr/>
+        <p:txBody>
+          <a:bodyPr/>
+          <a:lstStyle/>
+          <a:p>
+            <a:r>
+              <a:rPr lang="en-US" dirty="0" smtClean="0"/>
+              <a:t>To switch to an existing branch</a:t>
+            </a:r>
+          </a:p>
+          <a:p>
+            <a:r>
+              <a:rPr lang="en-US" dirty="0" smtClean="0"/>
+              <a:t>$</a:t>
+            </a:r>
+            <a:r>
+              <a:rPr lang="en-US" dirty="0" err="1" smtClean="0"/>
+              <a:t>git</a:t>
+            </a:r>
+            <a:r>
+              <a:rPr lang="en-US" dirty="0" smtClean="0"/>
+              <a:t> checkout testing </a:t>
+            </a:r>
+          </a:p>
+          <a:p>
+            <a:endParaRPr lang="en-US" dirty="0"/>
+          </a:p>
+        </p:txBody>
+      </p:sp>
+      <p:pic>
+        <p:nvPicPr>
+          <p:cNvPr id="4" name="Picture 3" descr="http://git-scm.com/figures/18333fig0306-tn.png"/>
+          <p:cNvPicPr/>
+          <p:nvPr/>
+        </p:nvPicPr>
+        <p:blipFill>
+          <a:blip r:embed="rId2">
+            <a:extLst>
+              <a:ext uri="{28A0092B-C50C-407E-A947-70E740481C1C}">
+                <a14:useLocalDpi xmlns:a14="http://schemas.microsoft.com/office/drawing/2010/main" val="0"/>
+              </a:ext>
+            </a:extLst>
+          </a:blip>
+          <a:srcRect/>
+          <a:stretch>
+            <a:fillRect/>
+          </a:stretch>
+        </p:blipFill>
+        <p:spPr bwMode="auto">
+          <a:xfrm>
+            <a:off x="1461265" y="3134314"/>
+            <a:ext cx="4978400" cy="3262924"/>
+          </a:xfrm>
+          <a:prstGeom prst="rect">
+            <a:avLst/>
+          </a:prstGeom>
+          <a:noFill/>
+          <a:ln>
+            <a:noFill/>
+          </a:ln>
+        </p:spPr>
+      </p:pic>
+    </p:spTree>
+    <p:extLst>
+      <p:ext uri="{BB962C8B-B14F-4D97-AF65-F5344CB8AC3E}">
+        <p14:creationId xmlns:p14="http://schemas.microsoft.com/office/powerpoint/2010/main" val="797087148"/>
+      </p:ext>
+    </p:extLst>
+  </p:cSld>
+  <p:clrMapOvr>
+    <a:masterClrMapping/>
+  </p:clrMapOvr>
+</p:sld>
+</file>
+
+<file path=ppt/slides/slide16.xml><?xml version="1.0" encoding="utf-8"?>
+<p:sld xmlns:a="http://schemas.openxmlformats.org/drawingml/2006/main" xmlns:r="http://schemas.openxmlformats.org/officeDocument/2006/relationships" xmlns:p="http://schemas.openxmlformats.org/presentationml/2006/main">
+  <p:cSld>
+    <p:spTree>
+      <p:nvGrpSpPr>
+        <p:cNvPr id="1" name=""/>
+        <p:cNvGrpSpPr/>
+        <p:nvPr/>
+      </p:nvGrpSpPr>
+      <p:grpSpPr>
+        <a:xfrm>
+          <a:off x="0" y="0"/>
+          <a:ext cx="0" cy="0"/>
+          <a:chOff x="0" y="0"/>
+          <a:chExt cx="0" cy="0"/>
+        </a:xfrm>
+      </p:grpSpPr>
+      <p:sp>
+        <p:nvSpPr>
+          <p:cNvPr id="2" name="Title 1"/>
+          <p:cNvSpPr>
+            <a:spLocks noGrp="1"/>
+          </p:cNvSpPr>
+          <p:nvPr>
+            <p:ph type="title"/>
+          </p:nvPr>
+        </p:nvSpPr>
+        <p:spPr/>
+        <p:txBody>
+          <a:bodyPr/>
+          <a:lstStyle/>
+          <a:p>
+            <a:r>
+              <a:rPr lang="en-US" dirty="0" smtClean="0"/>
+              <a:t>More on Branches ….</a:t>
+            </a:r>
+            <a:endParaRPr lang="en-US" dirty="0"/>
+          </a:p>
+        </p:txBody>
+      </p:sp>
+      <p:sp>
+        <p:nvSpPr>
+          <p:cNvPr id="3" name="Content Placeholder 2"/>
+          <p:cNvSpPr>
+            <a:spLocks noGrp="1"/>
+          </p:cNvSpPr>
+          <p:nvPr>
+            <p:ph sz="quarter" idx="1"/>
+          </p:nvPr>
+        </p:nvSpPr>
+        <p:spPr/>
+        <p:txBody>
+          <a:bodyPr/>
+          <a:lstStyle/>
+          <a:p>
+            <a:r>
+              <a:rPr lang="en-US" dirty="0" smtClean="0"/>
+              <a:t>$ </a:t>
+            </a:r>
+            <a:r>
+              <a:rPr lang="en-US" dirty="0" err="1" smtClean="0"/>
+              <a:t>git</a:t>
+            </a:r>
+            <a:r>
+              <a:rPr lang="en-US" dirty="0" smtClean="0"/>
+              <a:t> commit –am “I am a new message”</a:t>
+            </a:r>
+          </a:p>
+          <a:p>
+            <a:endParaRPr lang="en-US" dirty="0"/>
+          </a:p>
+        </p:txBody>
+      </p:sp>
+      <p:pic>
+        <p:nvPicPr>
+          <p:cNvPr id="4" name="Picture 3" descr="http://git-scm.com/figures/18333fig0307-tn.png"/>
+          <p:cNvPicPr/>
+          <p:nvPr/>
+        </p:nvPicPr>
+        <p:blipFill>
+          <a:blip r:embed="rId2">
+            <a:extLst>
+              <a:ext uri="{28A0092B-C50C-407E-A947-70E740481C1C}">
+                <a14:useLocalDpi xmlns:a14="http://schemas.microsoft.com/office/drawing/2010/main" val="0"/>
+              </a:ext>
+            </a:extLst>
+          </a:blip>
+          <a:srcRect/>
+          <a:stretch>
+            <a:fillRect/>
+          </a:stretch>
+        </p:blipFill>
+        <p:spPr bwMode="auto">
+          <a:xfrm>
+            <a:off x="1397000" y="2350735"/>
+            <a:ext cx="6350000" cy="2900715"/>
+          </a:xfrm>
+          <a:prstGeom prst="rect">
+            <a:avLst/>
+          </a:prstGeom>
+          <a:noFill/>
+          <a:ln>
+            <a:noFill/>
+          </a:ln>
+        </p:spPr>
+      </p:pic>
+    </p:spTree>
+    <p:extLst>
+      <p:ext uri="{BB962C8B-B14F-4D97-AF65-F5344CB8AC3E}">
+        <p14:creationId xmlns:p14="http://schemas.microsoft.com/office/powerpoint/2010/main" val="1994021982"/>
+      </p:ext>
+    </p:extLst>
+  </p:cSld>
+  <p:clrMapOvr>
+    <a:masterClrMapping/>
+  </p:clrMapOvr>
+</p:sld>
+</file>
+
+<file path=ppt/slides/slide17.xml><?xml version="1.0" encoding="utf-8"?>
+<p:sld xmlns:a="http://schemas.openxmlformats.org/drawingml/2006/main" xmlns:r="http://schemas.openxmlformats.org/officeDocument/2006/relationships" xmlns:p="http://schemas.openxmlformats.org/presentationml/2006/main">
+  <p:cSld>
+    <p:spTree>
+      <p:nvGrpSpPr>
+        <p:cNvPr id="1" name=""/>
+        <p:cNvGrpSpPr/>
+        <p:nvPr/>
+      </p:nvGrpSpPr>
+      <p:grpSpPr>
+        <a:xfrm>
+          <a:off x="0" y="0"/>
+          <a:ext cx="0" cy="0"/>
+          <a:chOff x="0" y="0"/>
+          <a:chExt cx="0" cy="0"/>
+        </a:xfrm>
+      </p:grpSpPr>
+      <p:sp>
+        <p:nvSpPr>
+          <p:cNvPr id="2" name="Title 1"/>
+          <p:cNvSpPr>
+            <a:spLocks noGrp="1"/>
+          </p:cNvSpPr>
+          <p:nvPr>
+            <p:ph type="title"/>
+          </p:nvPr>
+        </p:nvSpPr>
+        <p:spPr/>
+        <p:txBody>
+          <a:bodyPr/>
+          <a:lstStyle/>
+          <a:p>
+            <a:r>
+              <a:rPr lang="en-US" dirty="0" smtClean="0"/>
+              <a:t>More on Branches..</a:t>
+            </a:r>
+            <a:endParaRPr lang="en-US" dirty="0"/>
+          </a:p>
+        </p:txBody>
+      </p:sp>
+      <p:sp>
+        <p:nvSpPr>
+          <p:cNvPr id="3" name="Content Placeholder 2"/>
+          <p:cNvSpPr>
+            <a:spLocks noGrp="1"/>
+          </p:cNvSpPr>
+          <p:nvPr>
+            <p:ph sz="quarter" idx="1"/>
+          </p:nvPr>
+        </p:nvSpPr>
+        <p:spPr>
+          <a:xfrm>
+            <a:off x="914400" y="1447799"/>
+            <a:ext cx="7772400" cy="5145067"/>
+          </a:xfrm>
+        </p:spPr>
+        <p:txBody>
+          <a:bodyPr/>
+          <a:lstStyle/>
+          <a:p>
+            <a:r>
+              <a:rPr lang="en-US" dirty="0" smtClean="0"/>
+              <a:t>$</a:t>
+            </a:r>
+            <a:r>
+              <a:rPr lang="en-US" dirty="0" err="1" smtClean="0"/>
+              <a:t>git</a:t>
+            </a:r>
+            <a:r>
+              <a:rPr lang="en-US" dirty="0" smtClean="0"/>
+              <a:t> checkout master</a:t>
+            </a:r>
+          </a:p>
+          <a:p>
+            <a:r>
+              <a:rPr lang="en-US" dirty="0" smtClean="0"/>
+              <a:t>-- Moved the HEAD pointer back to master </a:t>
+            </a:r>
+          </a:p>
+          <a:p>
+            <a:r>
+              <a:rPr lang="en-US" dirty="0" smtClean="0"/>
+              <a:t>-- Reverted the files in your working directory back to the snapshot  that Master points to. 	</a:t>
+            </a:r>
+          </a:p>
+          <a:p>
+            <a:endParaRPr lang="en-US" dirty="0"/>
+          </a:p>
+        </p:txBody>
+      </p:sp>
+      <p:pic>
+        <p:nvPicPr>
+          <p:cNvPr id="4" name="Picture 3" descr="http://git-scm.com/figures/18333fig0308-tn.png"/>
+          <p:cNvPicPr/>
+          <p:nvPr/>
+        </p:nvPicPr>
+        <p:blipFill>
+          <a:blip r:embed="rId2">
+            <a:extLst>
+              <a:ext uri="{28A0092B-C50C-407E-A947-70E740481C1C}">
+                <a14:useLocalDpi xmlns:a14="http://schemas.microsoft.com/office/drawing/2010/main" val="0"/>
+              </a:ext>
+            </a:extLst>
+          </a:blip>
+          <a:srcRect/>
+          <a:stretch>
+            <a:fillRect/>
+          </a:stretch>
+        </p:blipFill>
+        <p:spPr bwMode="auto">
+          <a:xfrm>
+            <a:off x="1397000" y="3445041"/>
+            <a:ext cx="6350000" cy="2887205"/>
+          </a:xfrm>
+          <a:prstGeom prst="rect">
+            <a:avLst/>
+          </a:prstGeom>
+          <a:noFill/>
+          <a:ln>
+            <a:noFill/>
+          </a:ln>
+        </p:spPr>
+      </p:pic>
+    </p:spTree>
+    <p:extLst>
+      <p:ext uri="{BB962C8B-B14F-4D97-AF65-F5344CB8AC3E}">
+        <p14:creationId xmlns:p14="http://schemas.microsoft.com/office/powerpoint/2010/main" val="1230927426"/>
+      </p:ext>
+    </p:extLst>
+  </p:cSld>
+  <p:clrMapOvr>
+    <a:masterClrMapping/>
+  </p:clrMapOvr>
+</p:sld>
+</file>
+
+<file path=ppt/slides/slide18.xml><?xml version="1.0" encoding="utf-8"?>
+<p:sld xmlns:a="http://schemas.openxmlformats.org/drawingml/2006/main" xmlns:r="http://schemas.openxmlformats.org/officeDocument/2006/relationships" xmlns:p="http://schemas.openxmlformats.org/presentationml/2006/main">
+  <p:cSld>
+    <p:spTree>
+      <p:nvGrpSpPr>
+        <p:cNvPr id="1" name=""/>
+        <p:cNvGrpSpPr/>
+        <p:nvPr/>
+      </p:nvGrpSpPr>
+      <p:grpSpPr>
+        <a:xfrm>
+          <a:off x="0" y="0"/>
+          <a:ext cx="0" cy="0"/>
+          <a:chOff x="0" y="0"/>
+          <a:chExt cx="0" cy="0"/>
+        </a:xfrm>
+      </p:grpSpPr>
+      <p:sp>
+        <p:nvSpPr>
+          <p:cNvPr id="2" name="Title 1"/>
+          <p:cNvSpPr>
+            <a:spLocks noGrp="1"/>
+          </p:cNvSpPr>
+          <p:nvPr>
+            <p:ph type="title"/>
+          </p:nvPr>
+        </p:nvSpPr>
+        <p:spPr/>
+        <p:txBody>
+          <a:bodyPr/>
+          <a:lstStyle/>
+          <a:p>
+            <a:r>
+              <a:rPr lang="en-US" dirty="0" smtClean="0"/>
+              <a:t>More on Branches…</a:t>
+            </a:r>
+            <a:endParaRPr lang="en-US" dirty="0"/>
+          </a:p>
+        </p:txBody>
+      </p:sp>
+      <p:sp>
+        <p:nvSpPr>
+          <p:cNvPr id="3" name="Content Placeholder 2"/>
+          <p:cNvSpPr>
+            <a:spLocks noGrp="1"/>
+          </p:cNvSpPr>
+          <p:nvPr>
+            <p:ph sz="quarter" idx="1"/>
+          </p:nvPr>
+        </p:nvSpPr>
+        <p:spPr>
+          <a:xfrm>
+            <a:off x="914400" y="1675236"/>
+            <a:ext cx="7772400" cy="4344563"/>
+          </a:xfrm>
+        </p:spPr>
+        <p:txBody>
+          <a:bodyPr>
+            <a:normAutofit lnSpcReduction="10000"/>
+          </a:bodyPr>
+          <a:lstStyle/>
+          <a:p>
+            <a:r>
+              <a:rPr lang="en-US" dirty="0" smtClean="0"/>
+              <a:t>Create a branch and switch to the branch</a:t>
+            </a:r>
+          </a:p>
+          <a:p>
+            <a:pPr marL="0" indent="0">
+              <a:buNone/>
+            </a:pPr>
+            <a:r>
+              <a:rPr lang="en-US" dirty="0" smtClean="0"/>
+              <a:t>	$</a:t>
+            </a:r>
+            <a:r>
+              <a:rPr lang="en-US" dirty="0" err="1" smtClean="0"/>
+              <a:t>git</a:t>
+            </a:r>
+            <a:r>
+              <a:rPr lang="en-US" dirty="0" smtClean="0"/>
+              <a:t> checkout –b my-branch-name</a:t>
+            </a:r>
+          </a:p>
+          <a:p>
+            <a:r>
+              <a:rPr lang="en-US" dirty="0" smtClean="0"/>
+              <a:t>If you have uncommitted changes in your branch and if you want to switch branches GIT wont let u switch branches</a:t>
+            </a:r>
+          </a:p>
+          <a:p>
+            <a:r>
+              <a:rPr lang="en-US" dirty="0" smtClean="0"/>
+              <a:t>In which case you can temporarily stash or make a WIP commit</a:t>
+            </a:r>
+          </a:p>
+          <a:p>
+            <a:r>
+              <a:rPr lang="en-US" dirty="0" smtClean="0"/>
+              <a:t>Listing all the existing branches</a:t>
+            </a:r>
+          </a:p>
+          <a:p>
+            <a:pPr marL="0" indent="0">
+              <a:buNone/>
+            </a:pPr>
+            <a:r>
+              <a:rPr lang="en-US" dirty="0" smtClean="0"/>
+              <a:t>	$</a:t>
+            </a:r>
+            <a:r>
+              <a:rPr lang="en-US" dirty="0" err="1" smtClean="0"/>
+              <a:t>git</a:t>
+            </a:r>
+            <a:r>
+              <a:rPr lang="en-US" dirty="0" smtClean="0"/>
+              <a:t> branc</a:t>
+            </a:r>
+            <a:r>
+              <a:rPr lang="en-US" dirty="0"/>
+              <a:t>h</a:t>
+            </a:r>
+            <a:endParaRPr lang="en-US" dirty="0" smtClean="0"/>
+          </a:p>
+          <a:p>
+            <a:r>
+              <a:rPr lang="en-US" dirty="0" smtClean="0"/>
+              <a:t>Deleing a branch</a:t>
+            </a:r>
+          </a:p>
+          <a:p>
+            <a:pPr marL="0" indent="0">
+              <a:buNone/>
+            </a:pPr>
+            <a:r>
+              <a:rPr lang="en-US" dirty="0" smtClean="0"/>
+              <a:t>	$</a:t>
+            </a:r>
+            <a:r>
+              <a:rPr lang="en-US" dirty="0" err="1" smtClean="0"/>
+              <a:t>git</a:t>
+            </a:r>
+            <a:r>
+              <a:rPr lang="en-US" dirty="0" smtClean="0"/>
+              <a:t> branch –d my-branch-name</a:t>
+            </a:r>
+          </a:p>
+          <a:p>
+            <a:pPr marL="0" indent="0">
+              <a:buNone/>
+            </a:pPr>
+            <a:endParaRPr lang="en-US" dirty="0" smtClean="0"/>
+          </a:p>
+          <a:p>
+            <a:endParaRPr lang="en-US" dirty="0"/>
+          </a:p>
+        </p:txBody>
+      </p:sp>
+    </p:spTree>
+    <p:extLst>
+      <p:ext uri="{BB962C8B-B14F-4D97-AF65-F5344CB8AC3E}">
+        <p14:creationId xmlns:p14="http://schemas.microsoft.com/office/powerpoint/2010/main" val="162740389"/>
+      </p:ext>
+    </p:extLst>
+  </p:cSld>
+  <p:clrMapOvr>
+    <a:masterClrMapping/>
+  </p:clrMapOvr>
+</p:sld>
+</file>
+
+<file path=ppt/slides/slide19.xml><?xml version="1.0" encoding="utf-8"?>
+<p:sld xmlns:a="http://schemas.openxmlformats.org/drawingml/2006/main" xmlns:r="http://schemas.openxmlformats.org/officeDocument/2006/relationships" xmlns:p="http://schemas.openxmlformats.org/presentationml/2006/main">
+  <p:cSld>
+    <p:spTree>
+      <p:nvGrpSpPr>
+        <p:cNvPr id="1" name=""/>
+        <p:cNvGrpSpPr/>
+        <p:nvPr/>
+      </p:nvGrpSpPr>
+      <p:grpSpPr>
+        <a:xfrm>
+          <a:off x="0" y="0"/>
+          <a:ext cx="0" cy="0"/>
+          <a:chOff x="0" y="0"/>
+          <a:chExt cx="0" cy="0"/>
+        </a:xfrm>
+      </p:grpSpPr>
+      <p:sp>
+        <p:nvSpPr>
+          <p:cNvPr id="2" name="Title 1"/>
+          <p:cNvSpPr>
+            <a:spLocks noGrp="1"/>
+          </p:cNvSpPr>
+          <p:nvPr>
+            <p:ph type="title"/>
+          </p:nvPr>
+        </p:nvSpPr>
+        <p:spPr>
+          <a:xfrm>
+            <a:off x="914400" y="274638"/>
+            <a:ext cx="7772400" cy="468411"/>
+          </a:xfrm>
+        </p:spPr>
+        <p:txBody>
+          <a:bodyPr>
+            <a:normAutofit fontScale="90000"/>
+          </a:bodyPr>
+          <a:lstStyle/>
+          <a:p>
+            <a:r>
+              <a:rPr lang="en-US" dirty="0" smtClean="0"/>
+              <a:t>Merging</a:t>
+            </a:r>
+            <a:endParaRPr lang="en-US" dirty="0"/>
+          </a:p>
+        </p:txBody>
+      </p:sp>
+      <p:sp>
+        <p:nvSpPr>
+          <p:cNvPr id="3" name="Content Placeholder 2"/>
+          <p:cNvSpPr>
+            <a:spLocks noGrp="1"/>
+          </p:cNvSpPr>
+          <p:nvPr>
+            <p:ph sz="quarter" idx="1"/>
+          </p:nvPr>
+        </p:nvSpPr>
+        <p:spPr>
+          <a:xfrm>
+            <a:off x="914400" y="878148"/>
+            <a:ext cx="7772400" cy="5141652"/>
+          </a:xfrm>
+        </p:spPr>
+        <p:txBody>
+          <a:bodyPr/>
+          <a:lstStyle/>
+          <a:p>
+            <a:r>
+              <a:rPr lang="en-US" dirty="0"/>
+              <a:t>$</a:t>
+            </a:r>
+            <a:r>
+              <a:rPr lang="en-US" dirty="0" err="1"/>
+              <a:t>git</a:t>
+            </a:r>
+            <a:r>
+              <a:rPr lang="en-US" dirty="0"/>
+              <a:t> checkout master</a:t>
+            </a:r>
+          </a:p>
+          <a:p>
+            <a:r>
+              <a:rPr lang="en-US" dirty="0"/>
+              <a:t>$</a:t>
+            </a:r>
+            <a:r>
+              <a:rPr lang="en-US" dirty="0" err="1"/>
+              <a:t>git</a:t>
+            </a:r>
+            <a:r>
+              <a:rPr lang="en-US" dirty="0"/>
+              <a:t> merge </a:t>
+            </a:r>
+            <a:r>
+              <a:rPr lang="en-US" dirty="0" smtClean="0"/>
+              <a:t>hotfix</a:t>
+            </a:r>
+          </a:p>
+          <a:p>
+            <a:r>
+              <a:rPr lang="en-US" dirty="0" smtClean="0">
+                <a:solidFill>
+                  <a:srgbClr val="008000"/>
+                </a:solidFill>
+              </a:rPr>
+              <a:t>If the commit pointed to by the branch you merged in was directly upstream of the commit </a:t>
+            </a:r>
+            <a:r>
+              <a:rPr lang="en-US" dirty="0" err="1" smtClean="0">
+                <a:solidFill>
+                  <a:srgbClr val="008000"/>
+                </a:solidFill>
+              </a:rPr>
+              <a:t>you’r</a:t>
+            </a:r>
+            <a:r>
+              <a:rPr lang="en-US" dirty="0" smtClean="0">
+                <a:solidFill>
+                  <a:srgbClr val="008000"/>
+                </a:solidFill>
+              </a:rPr>
+              <a:t> on, </a:t>
+            </a:r>
+            <a:r>
+              <a:rPr lang="en-US" dirty="0" err="1" smtClean="0">
+                <a:solidFill>
+                  <a:srgbClr val="008000"/>
+                </a:solidFill>
+              </a:rPr>
+              <a:t>git</a:t>
+            </a:r>
+            <a:r>
+              <a:rPr lang="en-US" dirty="0" smtClean="0">
+                <a:solidFill>
+                  <a:srgbClr val="008000"/>
+                </a:solidFill>
+              </a:rPr>
+              <a:t> just moves the pointer forward. Hence you  see “Fast forward”   </a:t>
+            </a:r>
+          </a:p>
+          <a:p>
+            <a:endParaRPr lang="en-US" dirty="0"/>
+          </a:p>
+        </p:txBody>
+      </p:sp>
+      <p:pic>
+        <p:nvPicPr>
+          <p:cNvPr id="4" name="Picture 3" descr="http://git-scm.com/figures/18333fig0313-tn.png"/>
+          <p:cNvPicPr/>
+          <p:nvPr/>
+        </p:nvPicPr>
+        <p:blipFill>
+          <a:blip r:embed="rId2">
+            <a:extLst>
+              <a:ext uri="{28A0092B-C50C-407E-A947-70E740481C1C}">
+                <a14:useLocalDpi xmlns:a14="http://schemas.microsoft.com/office/drawing/2010/main" val="0"/>
+              </a:ext>
+            </a:extLst>
+          </a:blip>
+          <a:srcRect/>
+          <a:stretch>
+            <a:fillRect/>
+          </a:stretch>
+        </p:blipFill>
+        <p:spPr bwMode="auto">
+          <a:xfrm>
+            <a:off x="2124242" y="3644900"/>
+            <a:ext cx="4428901" cy="2583198"/>
+          </a:xfrm>
+          <a:prstGeom prst="rect">
+            <a:avLst/>
+          </a:prstGeom>
+          <a:noFill/>
+          <a:ln>
+            <a:noFill/>
+          </a:ln>
+        </p:spPr>
+      </p:pic>
+    </p:spTree>
+    <p:extLst>
+      <p:ext uri="{BB962C8B-B14F-4D97-AF65-F5344CB8AC3E}">
+        <p14:creationId xmlns:p14="http://schemas.microsoft.com/office/powerpoint/2010/main" val="1009187238"/>
+      </p:ext>
+    </p:extLst>
+  </p:cSld>
+  <p:clrMapOvr>
+    <a:masterClrMapping/>
+  </p:clrMapOvr>
 </p:sld>
 </file>
 
@@ -4770,6 +6162,932 @@
             <a:r>
               <a:rPr lang="en-US" dirty="0" smtClean="0"/>
               <a:t>  Other alternatives : CVS, Perforce, SCM. </a:t>
+            </a:r>
+            <a:endParaRPr lang="en-US" dirty="0"/>
+          </a:p>
+        </p:txBody>
+      </p:sp>
+    </p:spTree>
+  </p:cSld>
+  <p:clrMapOvr>
+    <a:masterClrMapping/>
+  </p:clrMapOvr>
+  <p:timing>
+    <p:tnLst>
+      <p:par>
+        <p:cTn xmlns:p14="http://schemas.microsoft.com/office/powerpoint/2010/main" id="1" dur="indefinite" restart="never" nodeType="tmRoot"/>
+      </p:par>
+    </p:tnLst>
+  </p:timing>
+</p:sld>
+</file>
+
+<file path=ppt/slides/slide20.xml><?xml version="1.0" encoding="utf-8"?>
+<p:sld xmlns:a="http://schemas.openxmlformats.org/drawingml/2006/main" xmlns:r="http://schemas.openxmlformats.org/officeDocument/2006/relationships" xmlns:p="http://schemas.openxmlformats.org/presentationml/2006/main">
+  <p:cSld>
+    <p:spTree>
+      <p:nvGrpSpPr>
+        <p:cNvPr id="1" name=""/>
+        <p:cNvGrpSpPr/>
+        <p:nvPr/>
+      </p:nvGrpSpPr>
+      <p:grpSpPr>
+        <a:xfrm>
+          <a:off x="0" y="0"/>
+          <a:ext cx="0" cy="0"/>
+          <a:chOff x="0" y="0"/>
+          <a:chExt cx="0" cy="0"/>
+        </a:xfrm>
+      </p:grpSpPr>
+      <p:sp>
+        <p:nvSpPr>
+          <p:cNvPr id="2" name="Title 1"/>
+          <p:cNvSpPr>
+            <a:spLocks noGrp="1"/>
+          </p:cNvSpPr>
+          <p:nvPr>
+            <p:ph type="title"/>
+          </p:nvPr>
+        </p:nvSpPr>
+        <p:spPr/>
+        <p:txBody>
+          <a:bodyPr/>
+          <a:lstStyle/>
+          <a:p>
+            <a:r>
+              <a:rPr lang="en-US" dirty="0" smtClean="0"/>
+              <a:t>More Merging</a:t>
+            </a:r>
+            <a:endParaRPr lang="en-US" dirty="0"/>
+          </a:p>
+        </p:txBody>
+      </p:sp>
+      <p:sp>
+        <p:nvSpPr>
+          <p:cNvPr id="3" name="Content Placeholder 2"/>
+          <p:cNvSpPr>
+            <a:spLocks noGrp="1"/>
+          </p:cNvSpPr>
+          <p:nvPr>
+            <p:ph sz="quarter" idx="1"/>
+          </p:nvPr>
+        </p:nvSpPr>
+        <p:spPr/>
+        <p:txBody>
+          <a:bodyPr/>
+          <a:lstStyle/>
+          <a:p>
+            <a:r>
+              <a:rPr lang="en-US" dirty="0" smtClean="0"/>
+              <a:t>But if your development history has diverged and you are merging onto a branch which is not a direct ancestor then GIT does a 3-way merge instead of just moving the branch pointer </a:t>
+            </a:r>
+            <a:r>
+              <a:rPr lang="en-US" dirty="0" err="1" smtClean="0"/>
+              <a:t>forward.It</a:t>
+            </a:r>
+            <a:r>
+              <a:rPr lang="en-US" dirty="0" smtClean="0"/>
+              <a:t> creates a snapshot that results from the 3-way merge</a:t>
+            </a:r>
+            <a:endParaRPr lang="en-US" dirty="0"/>
+          </a:p>
+        </p:txBody>
+      </p:sp>
+    </p:spTree>
+    <p:extLst>
+      <p:ext uri="{BB962C8B-B14F-4D97-AF65-F5344CB8AC3E}">
+        <p14:creationId xmlns:p14="http://schemas.microsoft.com/office/powerpoint/2010/main" val="703175847"/>
+      </p:ext>
+    </p:extLst>
+  </p:cSld>
+  <p:clrMapOvr>
+    <a:masterClrMapping/>
+  </p:clrMapOvr>
+</p:sld>
+</file>
+
+<file path=ppt/slides/slide21.xml><?xml version="1.0" encoding="utf-8"?>
+<p:sld xmlns:a="http://schemas.openxmlformats.org/drawingml/2006/main" xmlns:r="http://schemas.openxmlformats.org/officeDocument/2006/relationships" xmlns:p="http://schemas.openxmlformats.org/presentationml/2006/main">
+  <p:cSld>
+    <p:spTree>
+      <p:nvGrpSpPr>
+        <p:cNvPr id="1" name=""/>
+        <p:cNvGrpSpPr/>
+        <p:nvPr/>
+      </p:nvGrpSpPr>
+      <p:grpSpPr>
+        <a:xfrm>
+          <a:off x="0" y="0"/>
+          <a:ext cx="0" cy="0"/>
+          <a:chOff x="0" y="0"/>
+          <a:chExt cx="0" cy="0"/>
+        </a:xfrm>
+      </p:grpSpPr>
+      <p:sp>
+        <p:nvSpPr>
+          <p:cNvPr id="2" name="Title 1"/>
+          <p:cNvSpPr>
+            <a:spLocks noGrp="1"/>
+          </p:cNvSpPr>
+          <p:nvPr>
+            <p:ph type="title"/>
+          </p:nvPr>
+        </p:nvSpPr>
+        <p:spPr/>
+        <p:txBody>
+          <a:bodyPr/>
+          <a:lstStyle/>
+          <a:p>
+            <a:r>
+              <a:rPr lang="en-US" dirty="0" smtClean="0"/>
+              <a:t>Remote branches..</a:t>
+            </a:r>
+            <a:endParaRPr lang="en-US" dirty="0"/>
+          </a:p>
+        </p:txBody>
+      </p:sp>
+      <p:sp>
+        <p:nvSpPr>
+          <p:cNvPr id="3" name="Content Placeholder 2"/>
+          <p:cNvSpPr>
+            <a:spLocks noGrp="1"/>
+          </p:cNvSpPr>
+          <p:nvPr>
+            <p:ph sz="quarter" idx="1"/>
+          </p:nvPr>
+        </p:nvSpPr>
+        <p:spPr/>
+        <p:txBody>
+          <a:bodyPr/>
+          <a:lstStyle/>
+          <a:p>
+            <a:r>
+              <a:rPr lang="en-US" dirty="0" smtClean="0"/>
+              <a:t>They are references to the state of branch on your remote repository</a:t>
+            </a:r>
+          </a:p>
+          <a:p>
+            <a:r>
+              <a:rPr lang="en-US" dirty="0" smtClean="0"/>
+              <a:t>Origin – it</a:t>
+            </a:r>
+            <a:r>
+              <a:rPr lang="fr-FR" dirty="0" smtClean="0"/>
+              <a:t>’</a:t>
+            </a:r>
+            <a:r>
+              <a:rPr lang="en-US" dirty="0" smtClean="0"/>
+              <a:t>s the remote repository you cloned from </a:t>
+            </a:r>
+          </a:p>
+          <a:p>
+            <a:r>
+              <a:rPr lang="en-US" dirty="0" smtClean="0"/>
+              <a:t>When you first create a </a:t>
+            </a:r>
+            <a:r>
+              <a:rPr lang="en-US" dirty="0" err="1" smtClean="0"/>
+              <a:t>Github</a:t>
+            </a:r>
+            <a:r>
+              <a:rPr lang="en-US" dirty="0" smtClean="0"/>
+              <a:t> repository you do </a:t>
+            </a:r>
+          </a:p>
+          <a:p>
+            <a:pPr marL="0" indent="0">
+              <a:buNone/>
+            </a:pPr>
+            <a:r>
+              <a:rPr lang="en-US" dirty="0" smtClean="0"/>
+              <a:t>$</a:t>
+            </a:r>
+            <a:r>
+              <a:rPr lang="en-US" dirty="0" err="1" smtClean="0"/>
+              <a:t>git</a:t>
+            </a:r>
+            <a:r>
+              <a:rPr lang="en-US" dirty="0" smtClean="0"/>
+              <a:t> remote add origin </a:t>
+            </a:r>
+            <a:r>
+              <a:rPr lang="en-US" dirty="0" smtClean="0">
+                <a:hlinkClick r:id="rId2"/>
+              </a:rPr>
+              <a:t>https://github.com/sowjumn/mytest.git</a:t>
+            </a:r>
+            <a:endParaRPr lang="en-US" dirty="0" smtClean="0"/>
+          </a:p>
+          <a:p>
+            <a:pPr marL="0" indent="0">
+              <a:buNone/>
+            </a:pPr>
+            <a:endParaRPr lang="en-US" dirty="0"/>
+          </a:p>
+          <a:p>
+            <a:pPr marL="0" indent="0">
+              <a:buNone/>
+            </a:pPr>
+            <a:r>
+              <a:rPr lang="en-US" dirty="0" smtClean="0"/>
+              <a:t>$</a:t>
+            </a:r>
+            <a:r>
+              <a:rPr lang="en-US" dirty="0" err="1" smtClean="0"/>
+              <a:t>git</a:t>
+            </a:r>
+            <a:r>
+              <a:rPr lang="en-US" dirty="0" smtClean="0"/>
+              <a:t> push origin master</a:t>
+            </a:r>
+            <a:endParaRPr lang="en-US" dirty="0"/>
+          </a:p>
+        </p:txBody>
+      </p:sp>
+    </p:spTree>
+    <p:extLst>
+      <p:ext uri="{BB962C8B-B14F-4D97-AF65-F5344CB8AC3E}">
+        <p14:creationId xmlns:p14="http://schemas.microsoft.com/office/powerpoint/2010/main" val="2317846405"/>
+      </p:ext>
+    </p:extLst>
+  </p:cSld>
+  <p:clrMapOvr>
+    <a:masterClrMapping/>
+  </p:clrMapOvr>
+</p:sld>
+</file>
+
+<file path=ppt/slides/slide22.xml><?xml version="1.0" encoding="utf-8"?>
+<p:sld xmlns:a="http://schemas.openxmlformats.org/drawingml/2006/main" xmlns:r="http://schemas.openxmlformats.org/officeDocument/2006/relationships" xmlns:p="http://schemas.openxmlformats.org/presentationml/2006/main">
+  <p:cSld>
+    <p:spTree>
+      <p:nvGrpSpPr>
+        <p:cNvPr id="1" name=""/>
+        <p:cNvGrpSpPr/>
+        <p:nvPr/>
+      </p:nvGrpSpPr>
+      <p:grpSpPr>
+        <a:xfrm>
+          <a:off x="0" y="0"/>
+          <a:ext cx="0" cy="0"/>
+          <a:chOff x="0" y="0"/>
+          <a:chExt cx="0" cy="0"/>
+        </a:xfrm>
+      </p:grpSpPr>
+      <p:sp>
+        <p:nvSpPr>
+          <p:cNvPr id="2" name="Title 1"/>
+          <p:cNvSpPr>
+            <a:spLocks noGrp="1"/>
+          </p:cNvSpPr>
+          <p:nvPr>
+            <p:ph type="title"/>
+          </p:nvPr>
+        </p:nvSpPr>
+        <p:spPr/>
+        <p:txBody>
+          <a:bodyPr/>
+          <a:lstStyle/>
+          <a:p>
+            <a:r>
+              <a:rPr lang="en-US" dirty="0" smtClean="0"/>
+              <a:t>More on remote branches</a:t>
+            </a:r>
+            <a:endParaRPr lang="en-US" dirty="0"/>
+          </a:p>
+        </p:txBody>
+      </p:sp>
+      <p:sp>
+        <p:nvSpPr>
+          <p:cNvPr id="3" name="Content Placeholder 2"/>
+          <p:cNvSpPr>
+            <a:spLocks noGrp="1"/>
+          </p:cNvSpPr>
+          <p:nvPr>
+            <p:ph sz="quarter" idx="1"/>
+          </p:nvPr>
+        </p:nvSpPr>
+        <p:spPr/>
+        <p:txBody>
+          <a:bodyPr/>
+          <a:lstStyle/>
+          <a:p>
+            <a:r>
+              <a:rPr lang="en-US" dirty="0" smtClean="0"/>
+              <a:t>Pushing to a remote branch</a:t>
+            </a:r>
+          </a:p>
+          <a:p>
+            <a:pPr marL="0" indent="0">
+              <a:buNone/>
+            </a:pPr>
+            <a:r>
+              <a:rPr lang="en-US" dirty="0" smtClean="0"/>
+              <a:t>	$</a:t>
+            </a:r>
+            <a:r>
+              <a:rPr lang="en-US" dirty="0" err="1" smtClean="0"/>
+              <a:t>git</a:t>
+            </a:r>
+            <a:r>
+              <a:rPr lang="en-US" dirty="0" smtClean="0"/>
+              <a:t> push origin </a:t>
+            </a:r>
+            <a:r>
+              <a:rPr lang="en-US" dirty="0" err="1" smtClean="0"/>
+              <a:t>my_branch</a:t>
+            </a:r>
+            <a:endParaRPr lang="en-US" dirty="0" smtClean="0"/>
+          </a:p>
+          <a:p>
+            <a:r>
+              <a:rPr lang="en-US" dirty="0" smtClean="0"/>
+              <a:t>So your pair can do a </a:t>
+            </a:r>
+            <a:r>
+              <a:rPr lang="en-US" dirty="0" err="1" smtClean="0"/>
+              <a:t>git</a:t>
+            </a:r>
+            <a:r>
+              <a:rPr lang="en-US" dirty="0" smtClean="0"/>
+              <a:t> fetch to get that that reference</a:t>
+            </a:r>
+          </a:p>
+          <a:p>
+            <a:pPr marL="0" indent="0">
+              <a:buNone/>
+            </a:pPr>
+            <a:r>
+              <a:rPr lang="en-US" dirty="0" smtClean="0"/>
+              <a:t>	$</a:t>
+            </a:r>
+            <a:r>
+              <a:rPr lang="en-US" dirty="0" err="1"/>
+              <a:t>git</a:t>
+            </a:r>
+            <a:r>
+              <a:rPr lang="en-US" dirty="0"/>
+              <a:t> fetch origin</a:t>
+            </a:r>
+          </a:p>
+          <a:p>
+            <a:endParaRPr lang="en-US" dirty="0" smtClean="0"/>
+          </a:p>
+          <a:p>
+            <a:r>
+              <a:rPr lang="en-US" dirty="0" smtClean="0"/>
+              <a:t>To checkout a remote branch origin/</a:t>
+            </a:r>
+            <a:r>
+              <a:rPr lang="en-US" dirty="0" err="1" smtClean="0"/>
+              <a:t>my_branch</a:t>
+            </a:r>
+            <a:endParaRPr lang="en-US" dirty="0" smtClean="0"/>
+          </a:p>
+          <a:p>
+            <a:pPr marL="0" indent="0">
+              <a:buNone/>
+            </a:pPr>
+            <a:r>
+              <a:rPr lang="en-US" dirty="0" smtClean="0"/>
+              <a:t>	$</a:t>
+            </a:r>
+            <a:r>
+              <a:rPr lang="en-US" dirty="0" err="1" smtClean="0"/>
+              <a:t>git</a:t>
+            </a:r>
+            <a:r>
+              <a:rPr lang="en-US" dirty="0" smtClean="0"/>
+              <a:t> checkout –b </a:t>
+            </a:r>
+            <a:r>
+              <a:rPr lang="en-US" dirty="0" err="1" smtClean="0"/>
+              <a:t>my_branch_name</a:t>
+            </a:r>
+            <a:r>
+              <a:rPr lang="en-US" dirty="0" smtClean="0"/>
+              <a:t> origin/</a:t>
+            </a:r>
+            <a:r>
+              <a:rPr lang="en-US" dirty="0" err="1" smtClean="0"/>
+              <a:t>my_branch</a:t>
+            </a:r>
+            <a:endParaRPr lang="en-US" dirty="0" smtClean="0"/>
+          </a:p>
+          <a:p>
+            <a:pPr marL="0" indent="0">
+              <a:buNone/>
+            </a:pPr>
+            <a:r>
+              <a:rPr lang="en-US" dirty="0" smtClean="0"/>
+              <a:t>	</a:t>
+            </a:r>
+            <a:endParaRPr lang="en-US" dirty="0"/>
+          </a:p>
+        </p:txBody>
+      </p:sp>
+    </p:spTree>
+    <p:extLst>
+      <p:ext uri="{BB962C8B-B14F-4D97-AF65-F5344CB8AC3E}">
+        <p14:creationId xmlns:p14="http://schemas.microsoft.com/office/powerpoint/2010/main" val="4067788939"/>
+      </p:ext>
+    </p:extLst>
+  </p:cSld>
+  <p:clrMapOvr>
+    <a:masterClrMapping/>
+  </p:clrMapOvr>
+</p:sld>
+</file>
+
+<file path=ppt/slides/slide23.xml><?xml version="1.0" encoding="utf-8"?>
+<p:sld xmlns:a="http://schemas.openxmlformats.org/drawingml/2006/main" xmlns:r="http://schemas.openxmlformats.org/officeDocument/2006/relationships" xmlns:p="http://schemas.openxmlformats.org/presentationml/2006/main">
+  <p:cSld>
+    <p:spTree>
+      <p:nvGrpSpPr>
+        <p:cNvPr id="1" name=""/>
+        <p:cNvGrpSpPr/>
+        <p:nvPr/>
+      </p:nvGrpSpPr>
+      <p:grpSpPr>
+        <a:xfrm>
+          <a:off x="0" y="0"/>
+          <a:ext cx="0" cy="0"/>
+          <a:chOff x="0" y="0"/>
+          <a:chExt cx="0" cy="0"/>
+        </a:xfrm>
+      </p:grpSpPr>
+      <p:sp>
+        <p:nvSpPr>
+          <p:cNvPr id="2" name="Title 1"/>
+          <p:cNvSpPr>
+            <a:spLocks noGrp="1"/>
+          </p:cNvSpPr>
+          <p:nvPr>
+            <p:ph type="title"/>
+          </p:nvPr>
+        </p:nvSpPr>
+        <p:spPr>
+          <a:xfrm>
+            <a:off x="914400" y="274638"/>
+            <a:ext cx="7772400" cy="522450"/>
+          </a:xfrm>
+        </p:spPr>
+        <p:txBody>
+          <a:bodyPr>
+            <a:normAutofit fontScale="90000"/>
+          </a:bodyPr>
+          <a:lstStyle/>
+          <a:p>
+            <a:r>
+              <a:rPr lang="en-US" dirty="0" smtClean="0"/>
+              <a:t>Rebasing</a:t>
+            </a:r>
+            <a:endParaRPr lang="en-US" dirty="0"/>
+          </a:p>
+        </p:txBody>
+      </p:sp>
+      <p:sp>
+        <p:nvSpPr>
+          <p:cNvPr id="5" name="Content Placeholder 4"/>
+          <p:cNvSpPr>
+            <a:spLocks noGrp="1"/>
+          </p:cNvSpPr>
+          <p:nvPr>
+            <p:ph sz="quarter" idx="1"/>
+          </p:nvPr>
+        </p:nvSpPr>
+        <p:spPr>
+          <a:xfrm>
+            <a:off x="914400" y="797088"/>
+            <a:ext cx="7772400" cy="5222712"/>
+          </a:xfrm>
+        </p:spPr>
+        <p:txBody>
+          <a:bodyPr/>
+          <a:lstStyle/>
+          <a:p>
+            <a:r>
+              <a:rPr lang="en-US" dirty="0" smtClean="0"/>
+              <a:t>$</a:t>
+            </a:r>
+            <a:r>
+              <a:rPr lang="en-US" dirty="0" err="1" smtClean="0"/>
+              <a:t>git</a:t>
+            </a:r>
+            <a:r>
+              <a:rPr lang="en-US" dirty="0" smtClean="0"/>
+              <a:t> checkout experiment</a:t>
+            </a:r>
+          </a:p>
+          <a:p>
+            <a:r>
+              <a:rPr lang="en-US" dirty="0" smtClean="0"/>
+              <a:t>$</a:t>
+            </a:r>
+            <a:r>
+              <a:rPr lang="en-US" dirty="0" err="1" smtClean="0"/>
+              <a:t>git</a:t>
+            </a:r>
+            <a:r>
+              <a:rPr lang="en-US" dirty="0" smtClean="0"/>
+              <a:t> rebase master</a:t>
+            </a:r>
+          </a:p>
+          <a:p>
+            <a:r>
+              <a:rPr lang="en-US" dirty="0" smtClean="0"/>
+              <a:t>It takes the changes introduced in c3 and applies them on top of c4 </a:t>
+            </a:r>
+          </a:p>
+          <a:p>
+            <a:endParaRPr lang="en-US" dirty="0"/>
+          </a:p>
+          <a:p>
+            <a:endParaRPr lang="en-US" dirty="0"/>
+          </a:p>
+        </p:txBody>
+      </p:sp>
+      <p:pic>
+        <p:nvPicPr>
+          <p:cNvPr id="6" name="Picture 5" descr="http://git-scm.com/figures/18333fig0327-tn.png"/>
+          <p:cNvPicPr/>
+          <p:nvPr/>
+        </p:nvPicPr>
+        <p:blipFill>
+          <a:blip r:embed="rId2">
+            <a:extLst>
+              <a:ext uri="{28A0092B-C50C-407E-A947-70E740481C1C}">
+                <a14:useLocalDpi xmlns:a14="http://schemas.microsoft.com/office/drawing/2010/main" val="0"/>
+              </a:ext>
+            </a:extLst>
+          </a:blip>
+          <a:srcRect/>
+          <a:stretch>
+            <a:fillRect/>
+          </a:stretch>
+        </p:blipFill>
+        <p:spPr bwMode="auto">
+          <a:xfrm>
+            <a:off x="3116942" y="2805438"/>
+            <a:ext cx="3937000" cy="3111500"/>
+          </a:xfrm>
+          <a:prstGeom prst="rect">
+            <a:avLst/>
+          </a:prstGeom>
+          <a:noFill/>
+          <a:ln>
+            <a:noFill/>
+          </a:ln>
+        </p:spPr>
+      </p:pic>
+    </p:spTree>
+    <p:extLst>
+      <p:ext uri="{BB962C8B-B14F-4D97-AF65-F5344CB8AC3E}">
+        <p14:creationId xmlns:p14="http://schemas.microsoft.com/office/powerpoint/2010/main" val="747558975"/>
+      </p:ext>
+    </p:extLst>
+  </p:cSld>
+  <p:clrMapOvr>
+    <a:masterClrMapping/>
+  </p:clrMapOvr>
+</p:sld>
+</file>
+
+<file path=ppt/slides/slide24.xml><?xml version="1.0" encoding="utf-8"?>
+<p:sld xmlns:a="http://schemas.openxmlformats.org/drawingml/2006/main" xmlns:r="http://schemas.openxmlformats.org/officeDocument/2006/relationships" xmlns:p="http://schemas.openxmlformats.org/presentationml/2006/main">
+  <p:cSld>
+    <p:spTree>
+      <p:nvGrpSpPr>
+        <p:cNvPr id="1" name=""/>
+        <p:cNvGrpSpPr/>
+        <p:nvPr/>
+      </p:nvGrpSpPr>
+      <p:grpSpPr>
+        <a:xfrm>
+          <a:off x="0" y="0"/>
+          <a:ext cx="0" cy="0"/>
+          <a:chOff x="0" y="0"/>
+          <a:chExt cx="0" cy="0"/>
+        </a:xfrm>
+      </p:grpSpPr>
+      <p:sp>
+        <p:nvSpPr>
+          <p:cNvPr id="2" name="Title 1"/>
+          <p:cNvSpPr>
+            <a:spLocks noGrp="1"/>
+          </p:cNvSpPr>
+          <p:nvPr>
+            <p:ph type="title"/>
+          </p:nvPr>
+        </p:nvSpPr>
+        <p:spPr/>
+        <p:txBody>
+          <a:bodyPr/>
+          <a:lstStyle/>
+          <a:p>
+            <a:r>
+              <a:rPr lang="en-US" dirty="0" smtClean="0"/>
+              <a:t>Rebasing. </a:t>
+            </a:r>
+            <a:endParaRPr lang="en-US" dirty="0"/>
+          </a:p>
+        </p:txBody>
+      </p:sp>
+      <p:sp>
+        <p:nvSpPr>
+          <p:cNvPr id="5" name="Content Placeholder 4"/>
+          <p:cNvSpPr>
+            <a:spLocks noGrp="1"/>
+          </p:cNvSpPr>
+          <p:nvPr>
+            <p:ph sz="quarter" idx="1"/>
+          </p:nvPr>
+        </p:nvSpPr>
+        <p:spPr/>
+        <p:txBody>
+          <a:bodyPr/>
+          <a:lstStyle/>
+          <a:p>
+            <a:endParaRPr lang="en-US" dirty="0" smtClean="0"/>
+          </a:p>
+          <a:p>
+            <a:endParaRPr lang="en-US" dirty="0"/>
+          </a:p>
+          <a:p>
+            <a:endParaRPr lang="en-US" dirty="0"/>
+          </a:p>
+        </p:txBody>
+      </p:sp>
+      <p:pic>
+        <p:nvPicPr>
+          <p:cNvPr id="6" name="Picture 5" descr="http://git-scm.com/figures/18333fig0329-tn.png"/>
+          <p:cNvPicPr/>
+          <p:nvPr/>
+        </p:nvPicPr>
+        <p:blipFill>
+          <a:blip r:embed="rId2">
+            <a:extLst>
+              <a:ext uri="{28A0092B-C50C-407E-A947-70E740481C1C}">
+                <a14:useLocalDpi xmlns:a14="http://schemas.microsoft.com/office/drawing/2010/main" val="0"/>
+              </a:ext>
+            </a:extLst>
+          </a:blip>
+          <a:srcRect/>
+          <a:stretch>
+            <a:fillRect/>
+          </a:stretch>
+        </p:blipFill>
+        <p:spPr bwMode="auto">
+          <a:xfrm>
+            <a:off x="1095639" y="1767891"/>
+            <a:ext cx="4953000" cy="2349500"/>
+          </a:xfrm>
+          <a:prstGeom prst="rect">
+            <a:avLst/>
+          </a:prstGeom>
+          <a:noFill/>
+          <a:ln>
+            <a:noFill/>
+          </a:ln>
+        </p:spPr>
+      </p:pic>
+    </p:spTree>
+    <p:extLst>
+      <p:ext uri="{BB962C8B-B14F-4D97-AF65-F5344CB8AC3E}">
+        <p14:creationId xmlns:p14="http://schemas.microsoft.com/office/powerpoint/2010/main" val="1672957739"/>
+      </p:ext>
+    </p:extLst>
+  </p:cSld>
+  <p:clrMapOvr>
+    <a:masterClrMapping/>
+  </p:clrMapOvr>
+</p:sld>
+</file>
+
+<file path=ppt/slides/slide25.xml><?xml version="1.0" encoding="utf-8"?>
+<p:sld xmlns:a="http://schemas.openxmlformats.org/drawingml/2006/main" xmlns:r="http://schemas.openxmlformats.org/officeDocument/2006/relationships" xmlns:p="http://schemas.openxmlformats.org/presentationml/2006/main">
+  <p:cSld>
+    <p:spTree>
+      <p:nvGrpSpPr>
+        <p:cNvPr id="1" name=""/>
+        <p:cNvGrpSpPr/>
+        <p:nvPr/>
+      </p:nvGrpSpPr>
+      <p:grpSpPr>
+        <a:xfrm>
+          <a:off x="0" y="0"/>
+          <a:ext cx="0" cy="0"/>
+          <a:chOff x="0" y="0"/>
+          <a:chExt cx="0" cy="0"/>
+        </a:xfrm>
+      </p:grpSpPr>
+      <p:sp>
+        <p:nvSpPr>
+          <p:cNvPr id="2" name="Title 1"/>
+          <p:cNvSpPr>
+            <a:spLocks noGrp="1"/>
+          </p:cNvSpPr>
+          <p:nvPr>
+            <p:ph type="title"/>
+          </p:nvPr>
+        </p:nvSpPr>
+        <p:spPr/>
+        <p:txBody>
+          <a:bodyPr/>
+          <a:lstStyle/>
+          <a:p>
+            <a:r>
+              <a:rPr lang="en-US" dirty="0" smtClean="0"/>
+              <a:t>Rebasing</a:t>
+            </a:r>
+            <a:endParaRPr lang="en-US" dirty="0"/>
+          </a:p>
+        </p:txBody>
+      </p:sp>
+      <p:sp>
+        <p:nvSpPr>
+          <p:cNvPr id="3" name="Content Placeholder 2"/>
+          <p:cNvSpPr>
+            <a:spLocks noGrp="1"/>
+          </p:cNvSpPr>
+          <p:nvPr>
+            <p:ph sz="quarter" idx="1"/>
+          </p:nvPr>
+        </p:nvSpPr>
+        <p:spPr/>
+        <p:txBody>
+          <a:bodyPr/>
+          <a:lstStyle/>
+          <a:p>
+            <a:r>
+              <a:rPr lang="en-US" dirty="0" smtClean="0"/>
+              <a:t>$</a:t>
+            </a:r>
+            <a:r>
+              <a:rPr lang="en-US" dirty="0" err="1" smtClean="0"/>
+              <a:t>git</a:t>
+            </a:r>
+            <a:r>
+              <a:rPr lang="en-US" dirty="0" smtClean="0"/>
+              <a:t> checkout master</a:t>
+            </a:r>
+          </a:p>
+          <a:p>
+            <a:r>
+              <a:rPr lang="en-US" dirty="0" smtClean="0"/>
+              <a:t>$</a:t>
+            </a:r>
+            <a:r>
+              <a:rPr lang="en-US" dirty="0" err="1" smtClean="0"/>
+              <a:t>git</a:t>
+            </a:r>
+            <a:r>
+              <a:rPr lang="en-US" dirty="0" smtClean="0"/>
+              <a:t> merge experiment</a:t>
+            </a:r>
+          </a:p>
+          <a:p>
+            <a:endParaRPr lang="en-US" dirty="0"/>
+          </a:p>
+          <a:p>
+            <a:pPr marL="0" indent="0">
+              <a:buNone/>
+            </a:pPr>
+            <a:r>
+              <a:rPr lang="en-US" dirty="0" smtClean="0"/>
+              <a:t>YAY it</a:t>
+            </a:r>
+            <a:r>
+              <a:rPr lang="fr-FR" dirty="0" smtClean="0"/>
+              <a:t>’</a:t>
+            </a:r>
+            <a:r>
+              <a:rPr lang="en-US" dirty="0" smtClean="0"/>
+              <a:t>s a fast forward.</a:t>
+            </a:r>
+          </a:p>
+          <a:p>
+            <a:r>
+              <a:rPr lang="en-US" dirty="0"/>
+              <a:t>More info.. </a:t>
+            </a:r>
+            <a:endParaRPr lang="en-US" dirty="0" smtClean="0"/>
+          </a:p>
+          <a:p>
+            <a:pPr marL="0" indent="0">
+              <a:buNone/>
+            </a:pPr>
+            <a:r>
+              <a:rPr lang="en-US" dirty="0" smtClean="0"/>
+              <a:t>http</a:t>
+            </a:r>
+            <a:r>
+              <a:rPr lang="en-US" dirty="0"/>
+              <a:t>://</a:t>
+            </a:r>
+            <a:r>
+              <a:rPr lang="en-US" dirty="0" err="1"/>
+              <a:t>tech.socialchorus.com</a:t>
+            </a:r>
+            <a:r>
+              <a:rPr lang="en-US" dirty="0"/>
+              <a:t>/2013/06/18/</a:t>
+            </a:r>
+            <a:r>
+              <a:rPr lang="en-US" dirty="0" err="1"/>
+              <a:t>Git</a:t>
+            </a:r>
+            <a:r>
+              <a:rPr lang="en-US" dirty="0"/>
+              <a:t>-Squashing-Best-Practices-</a:t>
+            </a:r>
+            <a:r>
+              <a:rPr lang="en-US" dirty="0" err="1"/>
+              <a:t>Tips.html</a:t>
+            </a:r>
+            <a:endParaRPr lang="en-US" dirty="0"/>
+          </a:p>
+        </p:txBody>
+      </p:sp>
+    </p:spTree>
+    <p:extLst>
+      <p:ext uri="{BB962C8B-B14F-4D97-AF65-F5344CB8AC3E}">
+        <p14:creationId xmlns:p14="http://schemas.microsoft.com/office/powerpoint/2010/main" val="491725306"/>
+      </p:ext>
+    </p:extLst>
+  </p:cSld>
+  <p:clrMapOvr>
+    <a:masterClrMapping/>
+  </p:clrMapOvr>
+</p:sld>
+</file>
+
+<file path=ppt/slides/slide26.xml><?xml version="1.0" encoding="utf-8"?>
+<p:sld xmlns:a="http://schemas.openxmlformats.org/drawingml/2006/main" xmlns:r="http://schemas.openxmlformats.org/officeDocument/2006/relationships" xmlns:p="http://schemas.openxmlformats.org/presentationml/2006/main">
+  <p:cSld>
+    <p:spTree>
+      <p:nvGrpSpPr>
+        <p:cNvPr id="1" name=""/>
+        <p:cNvGrpSpPr/>
+        <p:nvPr/>
+      </p:nvGrpSpPr>
+      <p:grpSpPr>
+        <a:xfrm>
+          <a:off x="0" y="0"/>
+          <a:ext cx="0" cy="0"/>
+          <a:chOff x="0" y="0"/>
+          <a:chExt cx="0" cy="0"/>
+        </a:xfrm>
+      </p:grpSpPr>
+      <p:sp>
+        <p:nvSpPr>
+          <p:cNvPr id="2" name="Title 1"/>
+          <p:cNvSpPr>
+            <a:spLocks noGrp="1"/>
+          </p:cNvSpPr>
+          <p:nvPr>
+            <p:ph type="title"/>
+          </p:nvPr>
+        </p:nvSpPr>
+        <p:spPr/>
+        <p:txBody>
+          <a:bodyPr/>
+          <a:lstStyle/>
+          <a:p>
+            <a:r>
+              <a:rPr lang="en-US" dirty="0" smtClean="0"/>
+              <a:t>References</a:t>
+            </a:r>
+            <a:endParaRPr lang="en-US" dirty="0"/>
+          </a:p>
+        </p:txBody>
+      </p:sp>
+      <p:sp>
+        <p:nvSpPr>
+          <p:cNvPr id="3" name="Content Placeholder 2"/>
+          <p:cNvSpPr>
+            <a:spLocks noGrp="1"/>
+          </p:cNvSpPr>
+          <p:nvPr>
+            <p:ph sz="quarter" idx="1"/>
+          </p:nvPr>
+        </p:nvSpPr>
+        <p:spPr/>
+        <p:txBody>
+          <a:bodyPr/>
+          <a:lstStyle/>
+          <a:p>
+            <a:r>
+              <a:rPr lang="en-US" dirty="0" smtClean="0"/>
+              <a:t>http://git-</a:t>
+            </a:r>
+            <a:r>
+              <a:rPr lang="en-US" dirty="0" err="1" smtClean="0"/>
+              <a:t>scm.com</a:t>
+            </a:r>
+            <a:r>
+              <a:rPr lang="en-US" dirty="0" smtClean="0"/>
+              <a:t>/</a:t>
             </a:r>
             <a:endParaRPr lang="en-US" dirty="0"/>
           </a:p>
@@ -5082,11 +7400,7 @@
             </a:pPr>
             <a:r>
               <a:rPr lang="en-US" dirty="0" smtClean="0"/>
-              <a:t>Modify</a:t>
-            </a:r>
-            <a:r>
-              <a:rPr lang="en-US" dirty="0" smtClean="0"/>
-              <a:t>/create files in your working directory</a:t>
+              <a:t>Modify/create files in your working directory</a:t>
             </a:r>
           </a:p>
           <a:p>
@@ -5214,11 +7528,7 @@
           <a:p>
             <a:r>
               <a:rPr lang="en-US" dirty="0" smtClean="0"/>
-              <a:t>Clone an existing </a:t>
-            </a:r>
-            <a:r>
-              <a:rPr lang="en-US" dirty="0" smtClean="0"/>
-              <a:t>repository. </a:t>
+              <a:t>Clone an existing repository. </a:t>
             </a:r>
             <a:endParaRPr lang="en-US" dirty="0"/>
           </a:p>
@@ -5232,15 +7542,7 @@
             </a:r>
             <a:r>
               <a:rPr lang="en-US" dirty="0" smtClean="0"/>
-              <a:t>   </a:t>
-            </a:r>
-            <a:r>
-              <a:rPr lang="en-US" dirty="0" smtClean="0"/>
-              <a:t>$ </a:t>
-            </a:r>
-            <a:r>
-              <a:rPr lang="en-US" dirty="0" smtClean="0"/>
-              <a:t>git clone &lt;</a:t>
+              <a:t>   $ git clone &lt;</a:t>
             </a:r>
             <a:r>
               <a:rPr lang="en-US" dirty="0" err="1" smtClean="0"/>
@@ -5269,15 +7571,7 @@
           <a:p>
             <a:r>
               <a:rPr lang="en-US" dirty="0" smtClean="0"/>
-              <a:t>Check the </a:t>
-            </a:r>
-            <a:r>
-              <a:rPr lang="en-US" dirty="0" smtClean="0"/>
-              <a:t>state </a:t>
-            </a:r>
-            <a:r>
-              <a:rPr lang="en-US" dirty="0" smtClean="0"/>
-              <a:t>of your files( staged/unstaged/untracked )</a:t>
+              <a:t>Check the state of your files( staged/unstaged/untracked )</a:t>
             </a:r>
           </a:p>
           <a:p>
@@ -5461,7 +7755,6 @@
               <a:rPr lang="en-US" dirty="0" smtClean="0"/>
               <a:t> add –A </a:t>
             </a:r>
-            <a:endParaRPr lang="en-US" dirty="0" smtClean="0"/>
           </a:p>
           <a:p>
             <a:pPr>
@@ -5618,7 +7911,6 @@
               <a:rPr lang="en-US" dirty="0" smtClean="0"/>
               <a:t>	$ git commit </a:t>
             </a:r>
-            <a:endParaRPr lang="en-US" dirty="0" smtClean="0"/>
           </a:p>
           <a:p>
             <a:pPr>
@@ -5683,11 +7975,7 @@
           <a:p>
             <a:r>
               <a:rPr lang="en-US" dirty="0" smtClean="0"/>
-              <a:t>Removing </a:t>
-            </a:r>
-            <a:r>
-              <a:rPr lang="en-US" dirty="0" smtClean="0"/>
-              <a:t>a file from git </a:t>
+              <a:t>Removing a file from git </a:t>
             </a:r>
           </a:p>
           <a:p>
@@ -5708,11 +7996,7 @@
           <a:p>
             <a:r>
               <a:rPr lang="en-US" dirty="0" smtClean="0"/>
-              <a:t>Renaming/moving a </a:t>
-            </a:r>
-            <a:r>
-              <a:rPr lang="en-US" dirty="0" smtClean="0"/>
-              <a:t>file</a:t>
+              <a:t>Renaming/moving a file</a:t>
             </a:r>
           </a:p>
           <a:p>
@@ -5725,11 +8009,7 @@
             </a:r>
             <a:r>
               <a:rPr lang="en-US" dirty="0" smtClean="0"/>
-              <a:t>$ </a:t>
-            </a:r>
-            <a:r>
-              <a:rPr lang="en-US" dirty="0" smtClean="0"/>
-              <a:t>git mv file_from file_to</a:t>
+              <a:t>$ git mv file_from file_to</a:t>
             </a:r>
           </a:p>
           <a:p>

</xml_diff>